<commit_message>
Lecture 5 update and example
Expanding lecture 5 and added an example for 2 moving plates
</commit_message>
<xml_diff>
--- a/IBAMR Lectures/Lecture 5 - IBAMR Tutorial_ Changing Target Positions and Springs.pptx
+++ b/IBAMR Lectures/Lecture 5 - IBAMR Tutorial_ Changing Target Positions and Springs.pptx
@@ -6,7 +6,7 @@
     <p:sldMasterId id="2147483666" r:id="rId2"/>
   </p:sldMasterIdLst>
   <p:notesMasterIdLst>
-    <p:notesMasterId r:id="rId25"/>
+    <p:notesMasterId r:id="rId22"/>
   </p:notesMasterIdLst>
   <p:sldIdLst>
     <p:sldId id="256" r:id="rId3"/>
@@ -28,9 +28,6 @@
     <p:sldId id="272" r:id="rId19"/>
     <p:sldId id="273" r:id="rId20"/>
     <p:sldId id="274" r:id="rId21"/>
-    <p:sldId id="275" r:id="rId22"/>
-    <p:sldId id="276" r:id="rId23"/>
-    <p:sldId id="277" r:id="rId24"/>
   </p:sldIdLst>
   <p:sldSz cx="9144000" cy="6858000" type="screen4x3"/>
   <p:notesSz cx="6858000" cy="9144000"/>
@@ -263,6 +260,11 @@
       </a:defRPr>
     </a:lvl9pPr>
   </p:defaultTextStyle>
+  <p:extLst>
+    <p:ext uri="{EFAFB233-063F-42B5-8137-9DF3F51BA10A}">
+      <p15:sldGuideLst xmlns:p15="http://schemas.microsoft.com/office/powerpoint/2012/main"/>
+    </p:ext>
+  </p:extLst>
 </p:presentation>
 </file>
 
@@ -2062,333 +2064,6 @@
         </p:spPr>
       </p:sp>
     </p:spTree>
-  </p:cSld>
-  <p:clrMapOvr>
-    <a:masterClrMapping/>
-  </p:clrMapOvr>
-</p:notes>
-</file>
-
-<file path=ppt/notesSlides/notesSlide20.xml><?xml version="1.0" encoding="utf-8"?>
-<p:notes xmlns:a="http://schemas.openxmlformats.org/drawingml/2006/main" xmlns:r="http://schemas.openxmlformats.org/officeDocument/2006/relationships" xmlns:p="http://schemas.openxmlformats.org/presentationml/2006/main" showMasterSp="0" showMasterPhAnim="0">
-  <p:cSld>
-    <p:spTree>
-      <p:nvGrpSpPr>
-        <p:cNvPr id="1" name="Shape 188"/>
-        <p:cNvGrpSpPr/>
-        <p:nvPr/>
-      </p:nvGrpSpPr>
-      <p:grpSpPr>
-        <a:xfrm>
-          <a:off x="0" y="0"/>
-          <a:ext cx="0" cy="0"/>
-          <a:chOff x="0" y="0"/>
-          <a:chExt cx="0" cy="0"/>
-        </a:xfrm>
-      </p:grpSpPr>
-      <p:sp>
-        <p:nvSpPr>
-          <p:cNvPr id="189" name="Google Shape;189;p22:notes"/>
-          <p:cNvSpPr txBox="1">
-            <a:spLocks noGrp="1"/>
-          </p:cNvSpPr>
-          <p:nvPr>
-            <p:ph type="body" idx="1"/>
-          </p:nvPr>
-        </p:nvSpPr>
-        <p:spPr>
-          <a:xfrm>
-            <a:off x="685800" y="4343400"/>
-            <a:ext cx="5486400" cy="4114800"/>
-          </a:xfrm>
-          <a:prstGeom prst="rect">
-            <a:avLst/>
-          </a:prstGeom>
-        </p:spPr>
-        <p:txBody>
-          <a:bodyPr spcFirstLastPara="1" wrap="square" lIns="91425" tIns="91425" rIns="91425" bIns="91425" anchor="ctr" anchorCtr="0">
-            <a:noAutofit/>
-          </a:bodyPr>
-          <a:lstStyle/>
-          <a:p>
-            <a:pPr marL="0" lvl="0" indent="0" algn="l" rtl="0">
-              <a:spcBef>
-                <a:spcPts val="0"/>
-              </a:spcBef>
-              <a:spcAft>
-                <a:spcPts val="0"/>
-              </a:spcAft>
-              <a:buNone/>
-            </a:pPr>
-            <a:endParaRPr/>
-          </a:p>
-        </p:txBody>
-      </p:sp>
-      <p:sp>
-        <p:nvSpPr>
-          <p:cNvPr id="190" name="Google Shape;190;p22:notes"/>
-          <p:cNvSpPr>
-            <a:spLocks noGrp="1" noRot="1" noChangeAspect="1"/>
-          </p:cNvSpPr>
-          <p:nvPr>
-            <p:ph type="sldImg" idx="2"/>
-          </p:nvPr>
-        </p:nvSpPr>
-        <p:spPr>
-          <a:xfrm>
-            <a:off x="1143000" y="685800"/>
-            <a:ext cx="4572000" cy="3429000"/>
-          </a:xfrm>
-          <a:custGeom>
-            <a:avLst/>
-            <a:gdLst/>
-            <a:ahLst/>
-            <a:cxnLst/>
-            <a:rect l="l" t="t" r="r" b="b"/>
-            <a:pathLst>
-              <a:path w="120000" h="120000" extrusionOk="0">
-                <a:moveTo>
-                  <a:pt x="0" y="0"/>
-                </a:moveTo>
-                <a:lnTo>
-                  <a:pt x="120000" y="0"/>
-                </a:lnTo>
-                <a:lnTo>
-                  <a:pt x="120000" y="120000"/>
-                </a:lnTo>
-                <a:lnTo>
-                  <a:pt x="0" y="120000"/>
-                </a:lnTo>
-                <a:close/>
-              </a:path>
-            </a:pathLst>
-          </a:custGeom>
-        </p:spPr>
-      </p:sp>
-    </p:spTree>
-    <p:extLst>
-      <p:ext uri="{BB962C8B-B14F-4D97-AF65-F5344CB8AC3E}">
-        <p14:creationId xmlns:p14="http://schemas.microsoft.com/office/powerpoint/2010/main" val="2654530462"/>
-      </p:ext>
-    </p:extLst>
-  </p:cSld>
-  <p:clrMapOvr>
-    <a:masterClrMapping/>
-  </p:clrMapOvr>
-</p:notes>
-</file>
-
-<file path=ppt/notesSlides/notesSlide21.xml><?xml version="1.0" encoding="utf-8"?>
-<p:notes xmlns:a="http://schemas.openxmlformats.org/drawingml/2006/main" xmlns:r="http://schemas.openxmlformats.org/officeDocument/2006/relationships" xmlns:p="http://schemas.openxmlformats.org/presentationml/2006/main" showMasterSp="0" showMasterPhAnim="0">
-  <p:cSld>
-    <p:spTree>
-      <p:nvGrpSpPr>
-        <p:cNvPr id="1" name="Shape 195"/>
-        <p:cNvGrpSpPr/>
-        <p:nvPr/>
-      </p:nvGrpSpPr>
-      <p:grpSpPr>
-        <a:xfrm>
-          <a:off x="0" y="0"/>
-          <a:ext cx="0" cy="0"/>
-          <a:chOff x="0" y="0"/>
-          <a:chExt cx="0" cy="0"/>
-        </a:xfrm>
-      </p:grpSpPr>
-      <p:sp>
-        <p:nvSpPr>
-          <p:cNvPr id="196" name="Google Shape;196;p23:notes"/>
-          <p:cNvSpPr txBox="1">
-            <a:spLocks noGrp="1"/>
-          </p:cNvSpPr>
-          <p:nvPr>
-            <p:ph type="body" idx="1"/>
-          </p:nvPr>
-        </p:nvSpPr>
-        <p:spPr>
-          <a:xfrm>
-            <a:off x="685800" y="4343400"/>
-            <a:ext cx="5486400" cy="4114800"/>
-          </a:xfrm>
-          <a:prstGeom prst="rect">
-            <a:avLst/>
-          </a:prstGeom>
-        </p:spPr>
-        <p:txBody>
-          <a:bodyPr spcFirstLastPara="1" wrap="square" lIns="91425" tIns="91425" rIns="91425" bIns="91425" anchor="ctr" anchorCtr="0">
-            <a:noAutofit/>
-          </a:bodyPr>
-          <a:lstStyle/>
-          <a:p>
-            <a:pPr marL="0" lvl="0" indent="0" algn="l" rtl="0">
-              <a:spcBef>
-                <a:spcPts val="0"/>
-              </a:spcBef>
-              <a:spcAft>
-                <a:spcPts val="0"/>
-              </a:spcAft>
-              <a:buNone/>
-            </a:pPr>
-            <a:endParaRPr/>
-          </a:p>
-        </p:txBody>
-      </p:sp>
-      <p:sp>
-        <p:nvSpPr>
-          <p:cNvPr id="197" name="Google Shape;197;p23:notes"/>
-          <p:cNvSpPr>
-            <a:spLocks noGrp="1" noRot="1" noChangeAspect="1"/>
-          </p:cNvSpPr>
-          <p:nvPr>
-            <p:ph type="sldImg" idx="2"/>
-          </p:nvPr>
-        </p:nvSpPr>
-        <p:spPr>
-          <a:xfrm>
-            <a:off x="1143000" y="685800"/>
-            <a:ext cx="4572000" cy="3429000"/>
-          </a:xfrm>
-          <a:custGeom>
-            <a:avLst/>
-            <a:gdLst/>
-            <a:ahLst/>
-            <a:cxnLst/>
-            <a:rect l="l" t="t" r="r" b="b"/>
-            <a:pathLst>
-              <a:path w="120000" h="120000" extrusionOk="0">
-                <a:moveTo>
-                  <a:pt x="0" y="0"/>
-                </a:moveTo>
-                <a:lnTo>
-                  <a:pt x="120000" y="0"/>
-                </a:lnTo>
-                <a:lnTo>
-                  <a:pt x="120000" y="120000"/>
-                </a:lnTo>
-                <a:lnTo>
-                  <a:pt x="0" y="120000"/>
-                </a:lnTo>
-                <a:close/>
-              </a:path>
-            </a:pathLst>
-          </a:custGeom>
-        </p:spPr>
-      </p:sp>
-    </p:spTree>
-    <p:extLst>
-      <p:ext uri="{BB962C8B-B14F-4D97-AF65-F5344CB8AC3E}">
-        <p14:creationId xmlns:p14="http://schemas.microsoft.com/office/powerpoint/2010/main" val="3663917403"/>
-      </p:ext>
-    </p:extLst>
-  </p:cSld>
-  <p:clrMapOvr>
-    <a:masterClrMapping/>
-  </p:clrMapOvr>
-</p:notes>
-</file>
-
-<file path=ppt/notesSlides/notesSlide22.xml><?xml version="1.0" encoding="utf-8"?>
-<p:notes xmlns:a="http://schemas.openxmlformats.org/drawingml/2006/main" xmlns:r="http://schemas.openxmlformats.org/officeDocument/2006/relationships" xmlns:p="http://schemas.openxmlformats.org/presentationml/2006/main" showMasterSp="0" showMasterPhAnim="0">
-  <p:cSld>
-    <p:spTree>
-      <p:nvGrpSpPr>
-        <p:cNvPr id="1" name="Shape 201"/>
-        <p:cNvGrpSpPr/>
-        <p:nvPr/>
-      </p:nvGrpSpPr>
-      <p:grpSpPr>
-        <a:xfrm>
-          <a:off x="0" y="0"/>
-          <a:ext cx="0" cy="0"/>
-          <a:chOff x="0" y="0"/>
-          <a:chExt cx="0" cy="0"/>
-        </a:xfrm>
-      </p:grpSpPr>
-      <p:sp>
-        <p:nvSpPr>
-          <p:cNvPr id="202" name="Google Shape;202;p24:notes"/>
-          <p:cNvSpPr txBox="1">
-            <a:spLocks noGrp="1"/>
-          </p:cNvSpPr>
-          <p:nvPr>
-            <p:ph type="body" idx="1"/>
-          </p:nvPr>
-        </p:nvSpPr>
-        <p:spPr>
-          <a:xfrm>
-            <a:off x="685800" y="4343400"/>
-            <a:ext cx="5486400" cy="4114800"/>
-          </a:xfrm>
-          <a:prstGeom prst="rect">
-            <a:avLst/>
-          </a:prstGeom>
-        </p:spPr>
-        <p:txBody>
-          <a:bodyPr spcFirstLastPara="1" wrap="square" lIns="91425" tIns="91425" rIns="91425" bIns="91425" anchor="ctr" anchorCtr="0">
-            <a:noAutofit/>
-          </a:bodyPr>
-          <a:lstStyle/>
-          <a:p>
-            <a:pPr marL="0" lvl="0" indent="0" algn="l" rtl="0">
-              <a:spcBef>
-                <a:spcPts val="0"/>
-              </a:spcBef>
-              <a:spcAft>
-                <a:spcPts val="0"/>
-              </a:spcAft>
-              <a:buNone/>
-            </a:pPr>
-            <a:endParaRPr/>
-          </a:p>
-        </p:txBody>
-      </p:sp>
-      <p:sp>
-        <p:nvSpPr>
-          <p:cNvPr id="203" name="Google Shape;203;p24:notes"/>
-          <p:cNvSpPr>
-            <a:spLocks noGrp="1" noRot="1" noChangeAspect="1"/>
-          </p:cNvSpPr>
-          <p:nvPr>
-            <p:ph type="sldImg" idx="2"/>
-          </p:nvPr>
-        </p:nvSpPr>
-        <p:spPr>
-          <a:xfrm>
-            <a:off x="1143000" y="685800"/>
-            <a:ext cx="4572000" cy="3429000"/>
-          </a:xfrm>
-          <a:custGeom>
-            <a:avLst/>
-            <a:gdLst/>
-            <a:ahLst/>
-            <a:cxnLst/>
-            <a:rect l="l" t="t" r="r" b="b"/>
-            <a:pathLst>
-              <a:path w="120000" h="120000" extrusionOk="0">
-                <a:moveTo>
-                  <a:pt x="0" y="0"/>
-                </a:moveTo>
-                <a:lnTo>
-                  <a:pt x="120000" y="0"/>
-                </a:lnTo>
-                <a:lnTo>
-                  <a:pt x="120000" y="120000"/>
-                </a:lnTo>
-                <a:lnTo>
-                  <a:pt x="0" y="120000"/>
-                </a:lnTo>
-                <a:close/>
-              </a:path>
-            </a:pathLst>
-          </a:custGeom>
-        </p:spPr>
-      </p:sp>
-    </p:spTree>
-    <p:extLst>
-      <p:ext uri="{BB962C8B-B14F-4D97-AF65-F5344CB8AC3E}">
-        <p14:creationId xmlns:p14="http://schemas.microsoft.com/office/powerpoint/2010/main" val="1598510504"/>
-      </p:ext>
-    </p:extLst>
   </p:cSld>
   <p:clrMapOvr>
     <a:masterClrMapping/>
@@ -14314,7 +13989,7 @@
               <a:buNone/>
             </a:pPr>
             <a:r>
-              <a:rPr lang="en-US" sz="4400" b="0" i="0" u="none" strike="noStrike" cap="none">
+              <a:rPr lang="en-US" sz="4400" b="0" i="0" u="none" strike="noStrike" cap="none" dirty="0" smtClean="0">
                 <a:solidFill>
                   <a:schemeClr val="dk1"/>
                 </a:solidFill>
@@ -14323,9 +13998,21 @@
                 <a:cs typeface="Calibri"/>
                 <a:sym typeface="Calibri"/>
               </a:rPr>
-              <a:t>Why multiple boundaries?</a:t>
+              <a:t>Multiple boundaries</a:t>
             </a:r>
-            <a:endParaRPr sz="1800" b="0" i="0" u="none" strike="noStrike" cap="none">
+            <a:r>
+              <a:rPr lang="en-US" sz="4400" b="0" i="0" u="none" strike="noStrike" cap="none" dirty="0">
+                <a:solidFill>
+                  <a:schemeClr val="dk1"/>
+                </a:solidFill>
+                <a:latin typeface="Calibri"/>
+                <a:ea typeface="Calibri"/>
+                <a:cs typeface="Calibri"/>
+                <a:sym typeface="Calibri"/>
+              </a:rPr>
+              <a:t>?</a:t>
+            </a:r>
+            <a:endParaRPr sz="1800" b="0" i="0" u="none" strike="noStrike" cap="none" dirty="0">
               <a:solidFill>
                 <a:schemeClr val="dk1"/>
               </a:solidFill>
@@ -14381,7 +14068,7 @@
               <a:buChar char="●"/>
             </a:pPr>
             <a:r>
-              <a:rPr lang="en-US" sz="3200" b="0" i="0" u="none" strike="noStrike" cap="none">
+              <a:rPr lang="en-US" sz="3200" b="0" i="0" u="none" strike="noStrike" cap="none" dirty="0">
                 <a:solidFill>
                   <a:schemeClr val="dk1"/>
                 </a:solidFill>
@@ -14392,7 +14079,7 @@
               </a:rPr>
               <a:t>The advantage is that you can easily make them do different things.</a:t>
             </a:r>
-            <a:endParaRPr sz="3200" b="0" i="0" u="none" strike="noStrike" cap="none">
+            <a:endParaRPr sz="3200" b="0" i="0" u="none" strike="noStrike" cap="none" dirty="0">
               <a:solidFill>
                 <a:schemeClr val="dk1"/>
               </a:solidFill>
@@ -14418,7 +14105,7 @@
               <a:buChar char="●"/>
             </a:pPr>
             <a:r>
-              <a:rPr lang="en-US" sz="3200" b="0" i="0" u="none" strike="noStrike" cap="none">
+              <a:rPr lang="en-US" sz="3200" b="0" i="0" u="none" strike="noStrike" cap="none" dirty="0">
                 <a:solidFill>
                   <a:schemeClr val="dk1"/>
                 </a:solidFill>
@@ -14429,7 +14116,7 @@
               </a:rPr>
               <a:t>The disadvantage is that I don’t think you can connect springs between them.</a:t>
             </a:r>
-            <a:endParaRPr sz="3200" b="0" i="0" u="none" strike="noStrike" cap="none">
+            <a:endParaRPr sz="3200" b="0" i="0" u="none" strike="noStrike" cap="none" dirty="0">
               <a:solidFill>
                 <a:schemeClr val="dk1"/>
               </a:solidFill>
@@ -14455,7 +14142,7 @@
               <a:buChar char="●"/>
             </a:pPr>
             <a:r>
-              <a:rPr lang="en-US" sz="2800" b="0" i="0" u="none" strike="noStrike" cap="none">
+              <a:rPr lang="en-US" sz="2800" b="0" i="0" u="none" strike="noStrike" cap="none" dirty="0">
                 <a:solidFill>
                   <a:schemeClr val="dk1"/>
                 </a:solidFill>
@@ -14466,7 +14153,7 @@
               </a:rPr>
               <a:t>However, if you initialize boundaries in the same positions, they will stick together in those positions.</a:t>
             </a:r>
-            <a:endParaRPr sz="2800" b="0" i="0" u="none" strike="noStrike" cap="none">
+            <a:endParaRPr sz="2800" b="0" i="0" u="none" strike="noStrike" cap="none" dirty="0">
               <a:solidFill>
                 <a:schemeClr val="dk1"/>
               </a:solidFill>
@@ -14492,7 +14179,7 @@
               <a:buChar char="●"/>
             </a:pPr>
             <a:r>
-              <a:rPr lang="en-US" sz="2800" b="0" i="0" u="none" strike="noStrike" cap="none">
+              <a:rPr lang="en-US" sz="2800" b="0" i="0" u="none" strike="noStrike" cap="none" dirty="0">
                 <a:solidFill>
                   <a:schemeClr val="dk1"/>
                 </a:solidFill>
@@ -14503,7 +14190,7 @@
               </a:rPr>
               <a:t>This has the effect of gluing different boundaries or parts of boundaries together.</a:t>
             </a:r>
-            <a:endParaRPr sz="1800" b="0" i="0" u="none" strike="noStrike" cap="none">
+            <a:endParaRPr sz="1800" b="0" i="0" u="none" strike="noStrike" cap="none" dirty="0">
               <a:solidFill>
                 <a:schemeClr val="dk1"/>
               </a:solidFill>
@@ -16937,908 +16624,6 @@
         </p:txBody>
       </p:sp>
     </p:spTree>
-  </p:cSld>
-  <p:clrMapOvr>
-    <a:masterClrMapping/>
-  </p:clrMapOvr>
-</p:sld>
-</file>
-
-<file path=ppt/slides/slide20.xml><?xml version="1.0" encoding="utf-8"?>
-<p:sld xmlns:a="http://schemas.openxmlformats.org/drawingml/2006/main" xmlns:r="http://schemas.openxmlformats.org/officeDocument/2006/relationships" xmlns:p="http://schemas.openxmlformats.org/presentationml/2006/main">
-  <p:cSld>
-    <p:spTree>
-      <p:nvGrpSpPr>
-        <p:cNvPr id="1" name="Shape 191"/>
-        <p:cNvGrpSpPr/>
-        <p:nvPr/>
-      </p:nvGrpSpPr>
-      <p:grpSpPr>
-        <a:xfrm>
-          <a:off x="0" y="0"/>
-          <a:ext cx="0" cy="0"/>
-          <a:chOff x="0" y="0"/>
-          <a:chExt cx="0" cy="0"/>
-        </a:xfrm>
-      </p:grpSpPr>
-      <p:sp>
-        <p:nvSpPr>
-          <p:cNvPr id="192" name="Google Shape;192;p39"/>
-          <p:cNvSpPr txBox="1">
-            <a:spLocks noGrp="1"/>
-          </p:cNvSpPr>
-          <p:nvPr>
-            <p:ph type="title"/>
-          </p:nvPr>
-        </p:nvSpPr>
-        <p:spPr>
-          <a:xfrm>
-            <a:off x="457200" y="122238"/>
-            <a:ext cx="8229600" cy="1143000"/>
-          </a:xfrm>
-          <a:prstGeom prst="rect">
-            <a:avLst/>
-          </a:prstGeom>
-          <a:noFill/>
-          <a:ln>
-            <a:noFill/>
-          </a:ln>
-        </p:spPr>
-        <p:txBody>
-          <a:bodyPr spcFirstLastPara="1" wrap="square" lIns="91425" tIns="45700" rIns="91425" bIns="45700" anchor="ctr" anchorCtr="0">
-            <a:noAutofit/>
-          </a:bodyPr>
-          <a:lstStyle/>
-          <a:p>
-            <a:pPr marL="0" marR="0" lvl="0" indent="0" algn="ctr" rtl="0">
-              <a:spcBef>
-                <a:spcPts val="0"/>
-              </a:spcBef>
-              <a:spcAft>
-                <a:spcPts val="0"/>
-              </a:spcAft>
-              <a:buClr>
-                <a:schemeClr val="dk1"/>
-              </a:buClr>
-              <a:buFont typeface="Calibri"/>
-              <a:buNone/>
-            </a:pPr>
-            <a:r>
-              <a:rPr lang="en-US" sz="4400" b="0" i="0" u="none" strike="noStrike" cap="none">
-                <a:solidFill>
-                  <a:schemeClr val="dk1"/>
-                </a:solidFill>
-                <a:latin typeface="Calibri"/>
-                <a:ea typeface="Calibri"/>
-                <a:cs typeface="Calibri"/>
-                <a:sym typeface="Calibri"/>
-              </a:rPr>
-              <a:t>Stretching and shrinking plates</a:t>
-            </a:r>
-            <a:endParaRPr sz="1800" b="0" i="0" u="none" strike="noStrike" cap="none">
-              <a:solidFill>
-                <a:schemeClr val="dk1"/>
-              </a:solidFill>
-              <a:latin typeface="Calibri"/>
-              <a:ea typeface="Calibri"/>
-              <a:cs typeface="Calibri"/>
-              <a:sym typeface="Calibri"/>
-            </a:endParaRPr>
-          </a:p>
-        </p:txBody>
-      </p:sp>
-      <p:sp>
-        <p:nvSpPr>
-          <p:cNvPr id="193" name="Google Shape;193;p39"/>
-          <p:cNvSpPr txBox="1">
-            <a:spLocks noGrp="1"/>
-          </p:cNvSpPr>
-          <p:nvPr>
-            <p:ph type="body" idx="1"/>
-          </p:nvPr>
-        </p:nvSpPr>
-        <p:spPr>
-          <a:xfrm>
-            <a:off x="457200" y="1219201"/>
-            <a:ext cx="8229600" cy="1905000"/>
-          </a:xfrm>
-          <a:prstGeom prst="rect">
-            <a:avLst/>
-          </a:prstGeom>
-          <a:noFill/>
-          <a:ln>
-            <a:noFill/>
-          </a:ln>
-        </p:spPr>
-        <p:txBody>
-          <a:bodyPr spcFirstLastPara="1" wrap="square" lIns="91425" tIns="45700" rIns="91425" bIns="45700" anchor="t" anchorCtr="0">
-            <a:noAutofit/>
-          </a:bodyPr>
-          <a:lstStyle/>
-          <a:p>
-            <a:pPr marL="342900" marR="0" lvl="0" indent="-342900" algn="l" rtl="0">
-              <a:spcBef>
-                <a:spcPts val="640"/>
-              </a:spcBef>
-              <a:spcAft>
-                <a:spcPts val="0"/>
-              </a:spcAft>
-              <a:buClr>
-                <a:schemeClr val="dk1"/>
-              </a:buClr>
-              <a:buSzPts val="1900"/>
-              <a:buFont typeface="Calibri"/>
-              <a:buChar char="●"/>
-            </a:pPr>
-            <a:r>
-              <a:rPr lang="en-US" sz="2700" b="0" i="0" u="none" strike="noStrike" cap="none">
-                <a:solidFill>
-                  <a:schemeClr val="dk1"/>
-                </a:solidFill>
-                <a:latin typeface="Calibri"/>
-                <a:ea typeface="Calibri"/>
-                <a:cs typeface="Calibri"/>
-                <a:sym typeface="Calibri"/>
-              </a:rPr>
-              <a:t>You can comment out where you move the plates in update_target_point_positions, and remove the comment from update_springs.</a:t>
-            </a:r>
-            <a:endParaRPr sz="3200" b="0" i="0" u="none" strike="noStrike" cap="none">
-              <a:solidFill>
-                <a:schemeClr val="dk1"/>
-              </a:solidFill>
-              <a:latin typeface="Calibri"/>
-              <a:ea typeface="Calibri"/>
-              <a:cs typeface="Calibri"/>
-              <a:sym typeface="Calibri"/>
-            </a:endParaRPr>
-          </a:p>
-          <a:p>
-            <a:pPr marL="342900" marR="0" lvl="0" indent="-342900" algn="l" rtl="0">
-              <a:spcBef>
-                <a:spcPts val="0"/>
-              </a:spcBef>
-              <a:spcAft>
-                <a:spcPts val="0"/>
-              </a:spcAft>
-              <a:buClr>
-                <a:schemeClr val="dk1"/>
-              </a:buClr>
-              <a:buSzPts val="1900"/>
-              <a:buFont typeface="Calibri"/>
-              <a:buChar char="●"/>
-            </a:pPr>
-            <a:r>
-              <a:rPr lang="en-US" sz="2700" b="0" i="0" u="none" strike="noStrike" cap="none">
-                <a:solidFill>
-                  <a:schemeClr val="dk1"/>
-                </a:solidFill>
-                <a:latin typeface="Calibri"/>
-                <a:ea typeface="Calibri"/>
-                <a:cs typeface="Calibri"/>
-                <a:sym typeface="Calibri"/>
-              </a:rPr>
-              <a:t>The code in update_springs will make one plate stretch and the other shrink.</a:t>
-            </a:r>
-            <a:endParaRPr sz="1550" b="0" i="0" u="none" strike="noStrike" cap="none">
-              <a:solidFill>
-                <a:schemeClr val="dk1"/>
-              </a:solidFill>
-              <a:latin typeface="Calibri"/>
-              <a:ea typeface="Calibri"/>
-              <a:cs typeface="Calibri"/>
-              <a:sym typeface="Calibri"/>
-            </a:endParaRPr>
-          </a:p>
-        </p:txBody>
-      </p:sp>
-      <p:sp>
-        <p:nvSpPr>
-          <p:cNvPr id="194" name="Google Shape;194;p39"/>
-          <p:cNvSpPr/>
-          <p:nvPr/>
-        </p:nvSpPr>
-        <p:spPr>
-          <a:xfrm>
-            <a:off x="533400" y="3505200"/>
-            <a:ext cx="8305800" cy="3139321"/>
-          </a:xfrm>
-          <a:prstGeom prst="rect">
-            <a:avLst/>
-          </a:prstGeom>
-          <a:noFill/>
-          <a:ln>
-            <a:noFill/>
-          </a:ln>
-        </p:spPr>
-        <p:txBody>
-          <a:bodyPr spcFirstLastPara="1" wrap="square" lIns="91425" tIns="45700" rIns="91425" bIns="45700" anchor="t" anchorCtr="0">
-            <a:noAutofit/>
-          </a:bodyPr>
-          <a:lstStyle/>
-          <a:p>
-            <a:pPr marL="0" marR="0" lvl="0" indent="0" algn="l" rtl="0">
-              <a:spcBef>
-                <a:spcPts val="0"/>
-              </a:spcBef>
-              <a:spcAft>
-                <a:spcPts val="0"/>
-              </a:spcAft>
-              <a:buNone/>
-            </a:pPr>
-            <a:r>
-              <a:rPr lang="en-US" sz="1800" b="0" i="0" u="none" strike="noStrike" cap="none">
-                <a:solidFill>
-                  <a:schemeClr val="dk1"/>
-                </a:solidFill>
-                <a:latin typeface="Calibri"/>
-                <a:ea typeface="Calibri"/>
-                <a:cs typeface="Calibri"/>
-                <a:sym typeface="Calibri"/>
-              </a:rPr>
-              <a:t>if (plate2d_left_lag_idxs.first &lt;= lag_idx &amp;&amp; lag_idx &lt; plate2d_left_lag_idxs.second)</a:t>
-            </a:r>
-            <a:endParaRPr sz="1800" b="0" i="0" u="none" strike="noStrike" cap="none">
-              <a:solidFill>
-                <a:schemeClr val="dk1"/>
-              </a:solidFill>
-              <a:latin typeface="Calibri"/>
-              <a:ea typeface="Calibri"/>
-              <a:cs typeface="Calibri"/>
-              <a:sym typeface="Calibri"/>
-            </a:endParaRPr>
-          </a:p>
-          <a:p>
-            <a:pPr marL="0" marR="0" lvl="0" indent="0" algn="l" rtl="0">
-              <a:spcBef>
-                <a:spcPts val="0"/>
-              </a:spcBef>
-              <a:spcAft>
-                <a:spcPts val="0"/>
-              </a:spcAft>
-              <a:buNone/>
-            </a:pPr>
-            <a:r>
-              <a:rPr lang="en-US" sz="1800" b="0" i="0" u="none" strike="noStrike" cap="none">
-                <a:solidFill>
-                  <a:schemeClr val="dk1"/>
-                </a:solidFill>
-                <a:latin typeface="Calibri"/>
-                <a:ea typeface="Calibri"/>
-                <a:cs typeface="Calibri"/>
-                <a:sym typeface="Calibri"/>
-              </a:rPr>
-              <a:t>	 {</a:t>
-            </a:r>
-            <a:endParaRPr sz="1800" b="0" i="0" u="none" strike="noStrike" cap="none">
-              <a:solidFill>
-                <a:schemeClr val="dk1"/>
-              </a:solidFill>
-              <a:latin typeface="Calibri"/>
-              <a:ea typeface="Calibri"/>
-              <a:cs typeface="Calibri"/>
-              <a:sym typeface="Calibri"/>
-            </a:endParaRPr>
-          </a:p>
-          <a:p>
-            <a:pPr marL="0" marR="0" lvl="0" indent="0" algn="l" rtl="0">
-              <a:spcBef>
-                <a:spcPts val="0"/>
-              </a:spcBef>
-              <a:spcAft>
-                <a:spcPts val="0"/>
-              </a:spcAft>
-              <a:buNone/>
-            </a:pPr>
-            <a:r>
-              <a:rPr lang="en-US" sz="1800" b="0" i="0" u="none" strike="noStrike" cap="none">
-                <a:solidFill>
-                  <a:schemeClr val="dk1"/>
-                </a:solidFill>
-                <a:latin typeface="Calibri"/>
-                <a:ea typeface="Calibri"/>
-                <a:cs typeface="Calibri"/>
-                <a:sym typeface="Calibri"/>
-              </a:rPr>
-              <a:t>	resting_length[0]+=0.01*dt;</a:t>
-            </a:r>
-            <a:endParaRPr sz="1800" b="0" i="0" u="none" strike="noStrike" cap="none">
-              <a:solidFill>
-                <a:schemeClr val="dk1"/>
-              </a:solidFill>
-              <a:latin typeface="Calibri"/>
-              <a:ea typeface="Calibri"/>
-              <a:cs typeface="Calibri"/>
-              <a:sym typeface="Calibri"/>
-            </a:endParaRPr>
-          </a:p>
-          <a:p>
-            <a:pPr marL="0" marR="0" lvl="0" indent="0" algn="l" rtl="0">
-              <a:spcBef>
-                <a:spcPts val="0"/>
-              </a:spcBef>
-              <a:spcAft>
-                <a:spcPts val="0"/>
-              </a:spcAft>
-              <a:buNone/>
-            </a:pPr>
-            <a:r>
-              <a:rPr lang="en-US" sz="1800" b="0" i="0" u="none" strike="noStrike" cap="none">
-                <a:solidFill>
-                  <a:schemeClr val="dk1"/>
-                </a:solidFill>
-                <a:latin typeface="Calibri"/>
-                <a:ea typeface="Calibri"/>
-                <a:cs typeface="Calibri"/>
-                <a:sym typeface="Calibri"/>
-              </a:rPr>
-              <a:t>	//you could make the left plate grow and the right shrink</a:t>
-            </a:r>
-            <a:endParaRPr sz="1800" b="0" i="0" u="none" strike="noStrike" cap="none">
-              <a:solidFill>
-                <a:schemeClr val="dk1"/>
-              </a:solidFill>
-              <a:latin typeface="Calibri"/>
-              <a:ea typeface="Calibri"/>
-              <a:cs typeface="Calibri"/>
-              <a:sym typeface="Calibri"/>
-            </a:endParaRPr>
-          </a:p>
-          <a:p>
-            <a:pPr marL="0" marR="0" lvl="0" indent="0" algn="l" rtl="0">
-              <a:spcBef>
-                <a:spcPts val="0"/>
-              </a:spcBef>
-              <a:spcAft>
-                <a:spcPts val="0"/>
-              </a:spcAft>
-              <a:buNone/>
-            </a:pPr>
-            <a:r>
-              <a:rPr lang="en-US" sz="1800" b="0" i="0" u="none" strike="noStrike" cap="none">
-                <a:solidFill>
-                  <a:schemeClr val="dk1"/>
-                </a:solidFill>
-                <a:latin typeface="Calibri"/>
-                <a:ea typeface="Calibri"/>
-                <a:cs typeface="Calibri"/>
-                <a:sym typeface="Calibri"/>
-              </a:rPr>
-              <a:t>	 }</a:t>
-            </a:r>
-            <a:endParaRPr sz="1800" b="0" i="0" u="none" strike="noStrike" cap="none">
-              <a:solidFill>
-                <a:schemeClr val="dk1"/>
-              </a:solidFill>
-              <a:latin typeface="Calibri"/>
-              <a:ea typeface="Calibri"/>
-              <a:cs typeface="Calibri"/>
-              <a:sym typeface="Calibri"/>
-            </a:endParaRPr>
-          </a:p>
-          <a:p>
-            <a:pPr marL="0" marR="0" lvl="0" indent="0" algn="l" rtl="0">
-              <a:spcBef>
-                <a:spcPts val="0"/>
-              </a:spcBef>
-              <a:spcAft>
-                <a:spcPts val="0"/>
-              </a:spcAft>
-              <a:buNone/>
-            </a:pPr>
-            <a:r>
-              <a:rPr lang="en-US" sz="1800" b="0" i="0" u="none" strike="noStrike" cap="none">
-                <a:solidFill>
-                  <a:schemeClr val="dk1"/>
-                </a:solidFill>
-                <a:latin typeface="Calibri"/>
-                <a:ea typeface="Calibri"/>
-                <a:cs typeface="Calibri"/>
-                <a:sym typeface="Calibri"/>
-              </a:rPr>
-              <a:t>if (plate2d_rght_lag_idxs.first &lt;= lag_idx &amp;&amp; lag_idx &lt; plate2d_rght_lag_idxs.second)</a:t>
-            </a:r>
-            <a:endParaRPr sz="1800" b="0" i="0" u="none" strike="noStrike" cap="none">
-              <a:solidFill>
-                <a:schemeClr val="dk1"/>
-              </a:solidFill>
-              <a:latin typeface="Calibri"/>
-              <a:ea typeface="Calibri"/>
-              <a:cs typeface="Calibri"/>
-              <a:sym typeface="Calibri"/>
-            </a:endParaRPr>
-          </a:p>
-          <a:p>
-            <a:pPr marL="0" marR="0" lvl="0" indent="0" algn="l" rtl="0">
-              <a:spcBef>
-                <a:spcPts val="0"/>
-              </a:spcBef>
-              <a:spcAft>
-                <a:spcPts val="0"/>
-              </a:spcAft>
-              <a:buNone/>
-            </a:pPr>
-            <a:r>
-              <a:rPr lang="en-US" sz="1800" b="0" i="0" u="none" strike="noStrike" cap="none">
-                <a:solidFill>
-                  <a:schemeClr val="dk1"/>
-                </a:solidFill>
-                <a:latin typeface="Calibri"/>
-                <a:ea typeface="Calibri"/>
-                <a:cs typeface="Calibri"/>
-                <a:sym typeface="Calibri"/>
-              </a:rPr>
-              <a:t>	 {</a:t>
-            </a:r>
-            <a:endParaRPr sz="1800" b="0" i="0" u="none" strike="noStrike" cap="none">
-              <a:solidFill>
-                <a:schemeClr val="dk1"/>
-              </a:solidFill>
-              <a:latin typeface="Calibri"/>
-              <a:ea typeface="Calibri"/>
-              <a:cs typeface="Calibri"/>
-              <a:sym typeface="Calibri"/>
-            </a:endParaRPr>
-          </a:p>
-          <a:p>
-            <a:pPr marL="0" marR="0" lvl="0" indent="0" algn="l" rtl="0">
-              <a:spcBef>
-                <a:spcPts val="0"/>
-              </a:spcBef>
-              <a:spcAft>
-                <a:spcPts val="0"/>
-              </a:spcAft>
-              <a:buNone/>
-            </a:pPr>
-            <a:r>
-              <a:rPr lang="en-US" sz="1800" b="0" i="0" u="none" strike="noStrike" cap="none">
-                <a:solidFill>
-                  <a:schemeClr val="dk1"/>
-                </a:solidFill>
-                <a:latin typeface="Calibri"/>
-                <a:ea typeface="Calibri"/>
-                <a:cs typeface="Calibri"/>
-                <a:sym typeface="Calibri"/>
-              </a:rPr>
-              <a:t>	resting_length[0]-=0.01*dt;</a:t>
-            </a:r>
-            <a:endParaRPr sz="1800" b="0" i="0" u="none" strike="noStrike" cap="none">
-              <a:solidFill>
-                <a:schemeClr val="dk1"/>
-              </a:solidFill>
-              <a:latin typeface="Calibri"/>
-              <a:ea typeface="Calibri"/>
-              <a:cs typeface="Calibri"/>
-              <a:sym typeface="Calibri"/>
-            </a:endParaRPr>
-          </a:p>
-          <a:p>
-            <a:pPr marL="0" marR="0" lvl="0" indent="0" algn="l" rtl="0">
-              <a:spcBef>
-                <a:spcPts val="0"/>
-              </a:spcBef>
-              <a:spcAft>
-                <a:spcPts val="0"/>
-              </a:spcAft>
-              <a:buNone/>
-            </a:pPr>
-            <a:r>
-              <a:rPr lang="en-US" sz="1800" b="0" i="0" u="none" strike="noStrike" cap="none">
-                <a:solidFill>
-                  <a:schemeClr val="dk1"/>
-                </a:solidFill>
-                <a:latin typeface="Calibri"/>
-                <a:ea typeface="Calibri"/>
-                <a:cs typeface="Calibri"/>
-                <a:sym typeface="Calibri"/>
-              </a:rPr>
-              <a:t>	//you could make the left plate grow and the right shrink</a:t>
-            </a:r>
-            <a:endParaRPr sz="1800" b="0" i="0" u="none" strike="noStrike" cap="none">
-              <a:solidFill>
-                <a:schemeClr val="dk1"/>
-              </a:solidFill>
-              <a:latin typeface="Calibri"/>
-              <a:ea typeface="Calibri"/>
-              <a:cs typeface="Calibri"/>
-              <a:sym typeface="Calibri"/>
-            </a:endParaRPr>
-          </a:p>
-          <a:p>
-            <a:pPr marL="0" marR="0" lvl="0" indent="0" algn="l" rtl="0">
-              <a:spcBef>
-                <a:spcPts val="0"/>
-              </a:spcBef>
-              <a:spcAft>
-                <a:spcPts val="0"/>
-              </a:spcAft>
-              <a:buNone/>
-            </a:pPr>
-            <a:r>
-              <a:rPr lang="en-US" sz="1800" b="0" i="0" u="none" strike="noStrike" cap="none">
-                <a:solidFill>
-                  <a:schemeClr val="dk1"/>
-                </a:solidFill>
-                <a:latin typeface="Calibri"/>
-                <a:ea typeface="Calibri"/>
-                <a:cs typeface="Calibri"/>
-                <a:sym typeface="Calibri"/>
-              </a:rPr>
-              <a:t>	    }</a:t>
-            </a:r>
-            <a:endParaRPr sz="1800" b="0" i="0" u="none" strike="noStrike" cap="none">
-              <a:solidFill>
-                <a:schemeClr val="dk1"/>
-              </a:solidFill>
-              <a:latin typeface="Calibri"/>
-              <a:ea typeface="Calibri"/>
-              <a:cs typeface="Calibri"/>
-              <a:sym typeface="Calibri"/>
-            </a:endParaRPr>
-          </a:p>
-          <a:p>
-            <a:pPr marL="0" marR="0" lvl="0" indent="0" algn="l" rtl="0">
-              <a:spcBef>
-                <a:spcPts val="0"/>
-              </a:spcBef>
-              <a:spcAft>
-                <a:spcPts val="0"/>
-              </a:spcAft>
-              <a:buNone/>
-            </a:pPr>
-            <a:r>
-              <a:rPr lang="en-US" sz="1800" b="0" i="0" u="none" strike="noStrike" cap="none">
-                <a:solidFill>
-                  <a:schemeClr val="dk1"/>
-                </a:solidFill>
-                <a:latin typeface="Calibri"/>
-                <a:ea typeface="Calibri"/>
-                <a:cs typeface="Calibri"/>
-                <a:sym typeface="Calibri"/>
-              </a:rPr>
-              <a:t>		</a:t>
-            </a:r>
-            <a:endParaRPr sz="1800" b="0" i="0" u="none" strike="noStrike" cap="none">
-              <a:solidFill>
-                <a:schemeClr val="dk1"/>
-              </a:solidFill>
-              <a:latin typeface="Calibri"/>
-              <a:ea typeface="Calibri"/>
-              <a:cs typeface="Calibri"/>
-              <a:sym typeface="Calibri"/>
-            </a:endParaRPr>
-          </a:p>
-        </p:txBody>
-      </p:sp>
-    </p:spTree>
-    <p:extLst>
-      <p:ext uri="{BB962C8B-B14F-4D97-AF65-F5344CB8AC3E}">
-        <p14:creationId xmlns:p14="http://schemas.microsoft.com/office/powerpoint/2010/main" val="2404085782"/>
-      </p:ext>
-    </p:extLst>
-  </p:cSld>
-  <p:clrMapOvr>
-    <a:masterClrMapping/>
-  </p:clrMapOvr>
-</p:sld>
-</file>
-
-<file path=ppt/slides/slide21.xml><?xml version="1.0" encoding="utf-8"?>
-<p:sld xmlns:a="http://schemas.openxmlformats.org/drawingml/2006/main" xmlns:r="http://schemas.openxmlformats.org/officeDocument/2006/relationships" xmlns:p="http://schemas.openxmlformats.org/presentationml/2006/main">
-  <p:cSld>
-    <p:spTree>
-      <p:nvGrpSpPr>
-        <p:cNvPr id="1" name="Shape 198"/>
-        <p:cNvGrpSpPr/>
-        <p:nvPr/>
-      </p:nvGrpSpPr>
-      <p:grpSpPr>
-        <a:xfrm>
-          <a:off x="0" y="0"/>
-          <a:ext cx="0" cy="0"/>
-          <a:chOff x="0" y="0"/>
-          <a:chExt cx="0" cy="0"/>
-        </a:xfrm>
-      </p:grpSpPr>
-      <p:sp>
-        <p:nvSpPr>
-          <p:cNvPr id="199" name="Google Shape;199;p40"/>
-          <p:cNvSpPr txBox="1">
-            <a:spLocks noGrp="1"/>
-          </p:cNvSpPr>
-          <p:nvPr>
-            <p:ph type="title"/>
-          </p:nvPr>
-        </p:nvSpPr>
-        <p:spPr>
-          <a:xfrm>
-            <a:off x="457200" y="274638"/>
-            <a:ext cx="8229600" cy="1143000"/>
-          </a:xfrm>
-          <a:prstGeom prst="rect">
-            <a:avLst/>
-          </a:prstGeom>
-          <a:noFill/>
-          <a:ln>
-            <a:noFill/>
-          </a:ln>
-        </p:spPr>
-        <p:txBody>
-          <a:bodyPr spcFirstLastPara="1" wrap="square" lIns="91425" tIns="45700" rIns="91425" bIns="45700" anchor="ctr" anchorCtr="0">
-            <a:noAutofit/>
-          </a:bodyPr>
-          <a:lstStyle/>
-          <a:p>
-            <a:pPr marL="0" marR="0" lvl="0" indent="0" algn="ctr" rtl="0">
-              <a:spcBef>
-                <a:spcPts val="0"/>
-              </a:spcBef>
-              <a:spcAft>
-                <a:spcPts val="0"/>
-              </a:spcAft>
-              <a:buClr>
-                <a:schemeClr val="dk1"/>
-              </a:buClr>
-              <a:buFont typeface="Calibri"/>
-              <a:buNone/>
-            </a:pPr>
-            <a:r>
-              <a:rPr lang="en-US" sz="4400" b="0" i="0" u="none" strike="noStrike" cap="none">
-                <a:solidFill>
-                  <a:schemeClr val="dk1"/>
-                </a:solidFill>
-                <a:latin typeface="Calibri"/>
-                <a:ea typeface="Calibri"/>
-                <a:cs typeface="Calibri"/>
-                <a:sym typeface="Calibri"/>
-              </a:rPr>
-              <a:t>Left stretch, right shrink</a:t>
-            </a:r>
-            <a:endParaRPr sz="1800" b="0" i="0" u="none" strike="noStrike" cap="none">
-              <a:solidFill>
-                <a:schemeClr val="dk1"/>
-              </a:solidFill>
-              <a:latin typeface="Calibri"/>
-              <a:ea typeface="Calibri"/>
-              <a:cs typeface="Calibri"/>
-              <a:sym typeface="Calibri"/>
-            </a:endParaRPr>
-          </a:p>
-        </p:txBody>
-      </p:sp>
-      <p:pic>
-        <p:nvPicPr>
-          <p:cNvPr id="200" name="Google Shape;200;p40"/>
-          <p:cNvPicPr preferRelativeResize="0"/>
-          <p:nvPr/>
-        </p:nvPicPr>
-        <p:blipFill>
-          <a:blip r:embed="rId3">
-            <a:alphaModFix/>
-          </a:blip>
-          <a:stretch>
-            <a:fillRect/>
-          </a:stretch>
-        </p:blipFill>
-        <p:spPr>
-          <a:xfrm>
-            <a:off x="1981200" y="1447800"/>
-            <a:ext cx="5131377" cy="4872217"/>
-          </a:xfrm>
-          <a:prstGeom prst="rect">
-            <a:avLst/>
-          </a:prstGeom>
-          <a:noFill/>
-          <a:ln>
-            <a:noFill/>
-          </a:ln>
-        </p:spPr>
-      </p:pic>
-    </p:spTree>
-    <p:extLst>
-      <p:ext uri="{BB962C8B-B14F-4D97-AF65-F5344CB8AC3E}">
-        <p14:creationId xmlns:p14="http://schemas.microsoft.com/office/powerpoint/2010/main" val="2338987168"/>
-      </p:ext>
-    </p:extLst>
-  </p:cSld>
-  <p:clrMapOvr>
-    <a:masterClrMapping/>
-  </p:clrMapOvr>
-</p:sld>
-</file>
-
-<file path=ppt/slides/slide22.xml><?xml version="1.0" encoding="utf-8"?>
-<p:sld xmlns:a="http://schemas.openxmlformats.org/drawingml/2006/main" xmlns:r="http://schemas.openxmlformats.org/officeDocument/2006/relationships" xmlns:p="http://schemas.openxmlformats.org/presentationml/2006/main">
-  <p:cSld>
-    <p:spTree>
-      <p:nvGrpSpPr>
-        <p:cNvPr id="1" name="Shape 204"/>
-        <p:cNvGrpSpPr/>
-        <p:nvPr/>
-      </p:nvGrpSpPr>
-      <p:grpSpPr>
-        <a:xfrm>
-          <a:off x="0" y="0"/>
-          <a:ext cx="0" cy="0"/>
-          <a:chOff x="0" y="0"/>
-          <a:chExt cx="0" cy="0"/>
-        </a:xfrm>
-      </p:grpSpPr>
-      <p:sp>
-        <p:nvSpPr>
-          <p:cNvPr id="205" name="Google Shape;205;p41"/>
-          <p:cNvSpPr txBox="1">
-            <a:spLocks noGrp="1"/>
-          </p:cNvSpPr>
-          <p:nvPr>
-            <p:ph type="title"/>
-          </p:nvPr>
-        </p:nvSpPr>
-        <p:spPr>
-          <a:xfrm>
-            <a:off x="457200" y="274638"/>
-            <a:ext cx="8229600" cy="1143000"/>
-          </a:xfrm>
-          <a:prstGeom prst="rect">
-            <a:avLst/>
-          </a:prstGeom>
-          <a:noFill/>
-          <a:ln>
-            <a:noFill/>
-          </a:ln>
-        </p:spPr>
-        <p:txBody>
-          <a:bodyPr spcFirstLastPara="1" wrap="square" lIns="91425" tIns="45700" rIns="91425" bIns="45700" anchor="ctr" anchorCtr="0">
-            <a:noAutofit/>
-          </a:bodyPr>
-          <a:lstStyle/>
-          <a:p>
-            <a:pPr marL="0" marR="0" lvl="0" indent="0" algn="ctr" rtl="0">
-              <a:spcBef>
-                <a:spcPts val="0"/>
-              </a:spcBef>
-              <a:spcAft>
-                <a:spcPts val="0"/>
-              </a:spcAft>
-              <a:buClr>
-                <a:schemeClr val="dk1"/>
-              </a:buClr>
-              <a:buFont typeface="Calibri"/>
-              <a:buNone/>
-            </a:pPr>
-            <a:r>
-              <a:rPr lang="en-US" sz="4400" b="0" i="0" u="none" strike="noStrike" cap="none">
-                <a:solidFill>
-                  <a:schemeClr val="dk1"/>
-                </a:solidFill>
-                <a:latin typeface="Calibri"/>
-                <a:ea typeface="Calibri"/>
-                <a:cs typeface="Calibri"/>
-                <a:sym typeface="Calibri"/>
-              </a:rPr>
-              <a:t>Move and stretch?</a:t>
-            </a:r>
-            <a:endParaRPr sz="1800" b="0" i="0" u="none" strike="noStrike" cap="none">
-              <a:solidFill>
-                <a:schemeClr val="dk1"/>
-              </a:solidFill>
-              <a:latin typeface="Calibri"/>
-              <a:ea typeface="Calibri"/>
-              <a:cs typeface="Calibri"/>
-              <a:sym typeface="Calibri"/>
-            </a:endParaRPr>
-          </a:p>
-        </p:txBody>
-      </p:sp>
-      <p:sp>
-        <p:nvSpPr>
-          <p:cNvPr id="206" name="Google Shape;206;p41"/>
-          <p:cNvSpPr txBox="1">
-            <a:spLocks noGrp="1"/>
-          </p:cNvSpPr>
-          <p:nvPr>
-            <p:ph type="body" idx="1"/>
-          </p:nvPr>
-        </p:nvSpPr>
-        <p:spPr>
-          <a:xfrm>
-            <a:off x="457200" y="1600200"/>
-            <a:ext cx="8229600" cy="4525963"/>
-          </a:xfrm>
-          <a:prstGeom prst="rect">
-            <a:avLst/>
-          </a:prstGeom>
-          <a:noFill/>
-          <a:ln>
-            <a:noFill/>
-          </a:ln>
-        </p:spPr>
-        <p:txBody>
-          <a:bodyPr spcFirstLastPara="1" wrap="square" lIns="91425" tIns="45700" rIns="91425" bIns="45700" anchor="t" anchorCtr="0">
-            <a:noAutofit/>
-          </a:bodyPr>
-          <a:lstStyle/>
-          <a:p>
-            <a:pPr marL="342900" marR="0" lvl="0" indent="-342900" algn="l" rtl="0">
-              <a:spcBef>
-                <a:spcPts val="640"/>
-              </a:spcBef>
-              <a:spcAft>
-                <a:spcPts val="0"/>
-              </a:spcAft>
-              <a:buClr>
-                <a:schemeClr val="dk1"/>
-              </a:buClr>
-              <a:buSzPts val="1900"/>
-              <a:buFont typeface="Calibri"/>
-              <a:buChar char="●"/>
-            </a:pPr>
-            <a:r>
-              <a:rPr lang="en-US" sz="3200" b="0" i="0" u="none" strike="noStrike" cap="none">
-                <a:solidFill>
-                  <a:schemeClr val="dk1"/>
-                </a:solidFill>
-                <a:latin typeface="Calibri"/>
-                <a:ea typeface="Calibri"/>
-                <a:cs typeface="Calibri"/>
-                <a:sym typeface="Calibri"/>
-              </a:rPr>
-              <a:t>You do not want to move the boundaries with target points and stretch/shrink the plates at the same time.</a:t>
-            </a:r>
-            <a:endParaRPr sz="3200" b="0" i="0" u="none" strike="noStrike" cap="none">
-              <a:solidFill>
-                <a:schemeClr val="dk1"/>
-              </a:solidFill>
-              <a:latin typeface="Calibri"/>
-              <a:ea typeface="Calibri"/>
-              <a:cs typeface="Calibri"/>
-              <a:sym typeface="Calibri"/>
-            </a:endParaRPr>
-          </a:p>
-          <a:p>
-            <a:pPr marL="342900" marR="0" lvl="0" indent="-342900" algn="l" rtl="0">
-              <a:spcBef>
-                <a:spcPts val="0"/>
-              </a:spcBef>
-              <a:spcAft>
-                <a:spcPts val="0"/>
-              </a:spcAft>
-              <a:buClr>
-                <a:schemeClr val="dk1"/>
-              </a:buClr>
-              <a:buSzPts val="1900"/>
-              <a:buFont typeface="Calibri"/>
-              <a:buChar char="●"/>
-            </a:pPr>
-            <a:r>
-              <a:rPr lang="en-US" sz="3200" b="0" i="0" u="none" strike="noStrike" cap="none">
-                <a:solidFill>
-                  <a:schemeClr val="dk1"/>
-                </a:solidFill>
-                <a:latin typeface="Calibri"/>
-                <a:ea typeface="Calibri"/>
-                <a:cs typeface="Calibri"/>
-                <a:sym typeface="Calibri"/>
-              </a:rPr>
-              <a:t>Why would this be problematic?</a:t>
-            </a:r>
-            <a:endParaRPr sz="1800" b="0" i="0" u="none" strike="noStrike" cap="none">
-              <a:solidFill>
-                <a:schemeClr val="dk1"/>
-              </a:solidFill>
-              <a:latin typeface="Calibri"/>
-              <a:ea typeface="Calibri"/>
-              <a:cs typeface="Calibri"/>
-              <a:sym typeface="Calibri"/>
-            </a:endParaRPr>
-          </a:p>
-        </p:txBody>
-      </p:sp>
-    </p:spTree>
-    <p:extLst>
-      <p:ext uri="{BB962C8B-B14F-4D97-AF65-F5344CB8AC3E}">
-        <p14:creationId xmlns:p14="http://schemas.microsoft.com/office/powerpoint/2010/main" val="3168083059"/>
-      </p:ext>
-    </p:extLst>
   </p:cSld>
   <p:clrMapOvr>
     <a:masterClrMapping/>

</xml_diff>

<commit_message>
Update Lecture 5 - IBAMR Tutorial_ Changing Target Positions and Springs.pptx
</commit_message>
<xml_diff>
--- a/IBAMR Lectures/Lecture 5 - IBAMR Tutorial_ Changing Target Positions and Springs.pptx
+++ b/IBAMR Lectures/Lecture 5 - IBAMR Tutorial_ Changing Target Positions and Springs.pptx
@@ -12620,7 +12620,7 @@
               <a:buNone/>
             </a:pPr>
             <a:r>
-              <a:rPr lang="en" sz="1800" b="0" i="0" u="none" strike="noStrike" cap="none">
+              <a:rPr lang="en" sz="1800" b="0" i="0" u="none" strike="noStrike" cap="none" dirty="0">
                 <a:solidFill>
                   <a:schemeClr val="dk1"/>
                 </a:solidFill>
@@ -12631,7 +12631,7 @@
               </a:rPr>
               <a:t>If you use class IBStandardInitializer to initialize the Lagrangian structure and provide a ".spring" file, then the first point in each spring will have associated with it an object of type IBSpringForceSpec. You can access that object via:</a:t>
             </a:r>
-            <a:endParaRPr sz="1800" b="0" i="0" u="none" strike="noStrike" cap="none">
+            <a:endParaRPr sz="1800" b="0" i="0" u="none" strike="noStrike" cap="none" dirty="0">
               <a:solidFill>
                 <a:schemeClr val="dk1"/>
               </a:solidFill>
@@ -12651,7 +12651,7 @@
               </a:spcAft>
               <a:buNone/>
             </a:pPr>
-            <a:endParaRPr sz="1800" b="0" i="0" u="none" strike="noStrike" cap="none">
+            <a:endParaRPr sz="1800" b="0" i="0" u="none" strike="noStrike" cap="none" dirty="0">
               <a:solidFill>
                 <a:schemeClr val="dk1"/>
               </a:solidFill>
@@ -12679,7 +12679,7 @@
               <a:buNone/>
             </a:pPr>
             <a:r>
-              <a:rPr lang="en" sz="1800" b="0" i="0" u="none" strike="noStrike" cap="none">
+              <a:rPr lang="en" sz="1800" b="0" i="0" u="none" strike="noStrike" cap="none" dirty="0">
                 <a:solidFill>
                   <a:schemeClr val="dk1"/>
                 </a:solidFill>
@@ -12690,7 +12690,7 @@
               </a:rPr>
               <a:t> tbox::Pointer&lt;IBSpringForceSpec&gt; spring_spec = node_idx.getStashData&lt;IBSpringForceSpec&gt;();</a:t>
             </a:r>
-            <a:endParaRPr sz="1800" b="0" i="0" u="none" strike="noStrike" cap="none">
+            <a:endParaRPr sz="1800" b="0" i="0" u="none" strike="noStrike" cap="none" dirty="0">
               <a:solidFill>
                 <a:schemeClr val="dk1"/>
               </a:solidFill>
@@ -12710,7 +12710,7 @@
               </a:spcAft>
               <a:buNone/>
             </a:pPr>
-            <a:endParaRPr sz="1800" b="0" i="0" u="none" strike="noStrike" cap="none">
+            <a:endParaRPr sz="1800" b="0" i="0" u="none" strike="noStrike" cap="none" dirty="0">
               <a:solidFill>
                 <a:schemeClr val="dk1"/>
               </a:solidFill>
@@ -12734,7 +12734,7 @@
               <a:buNone/>
             </a:pPr>
             <a:r>
-              <a:rPr lang="en" sz="1800" b="1" i="0" u="none" strike="noStrike" cap="none">
+              <a:rPr lang="en" sz="1800" b="1" i="0" u="none" strike="noStrike" cap="none" dirty="0">
                 <a:solidFill>
                   <a:schemeClr val="dk1"/>
                 </a:solidFill>
@@ -12746,7 +12746,7 @@
               <a:t>Note:</a:t>
             </a:r>
             <a:r>
-              <a:rPr lang="en" sz="1800" b="0" i="0" u="none" strike="noStrike" cap="none">
+              <a:rPr lang="en" sz="1800" b="0" i="0" u="none" strike="noStrike" cap="none" dirty="0">
                 <a:solidFill>
                   <a:schemeClr val="dk1"/>
                 </a:solidFill>
@@ -12757,7 +12757,7 @@
               </a:rPr>
               <a:t> Each spring is associated with ONLY ONE of the two ends of the spring. By default, this is the "master" point index, which is simply the lower of the two indices. This means that it is possible for some IB points not to have any force spec objects, even though those points might be connected to another point by a spring (or a beam). If there are not any objects of a specified type T associated with a particular node, then the function getStashData&lt;T&gt;() will return a null pointer. You should always check to see if the returned pointer is non-null before trying to do anything with it.</a:t>
             </a:r>
-            <a:endParaRPr sz="1800" b="0" i="0" u="none" strike="noStrike" cap="none">
+            <a:endParaRPr sz="1800" b="0" i="0" u="none" strike="noStrike" cap="none" dirty="0">
               <a:solidFill>
                 <a:schemeClr val="dk1"/>
               </a:solidFill>
@@ -12777,7 +12777,7 @@
               </a:spcAft>
               <a:buNone/>
             </a:pPr>
-            <a:endParaRPr sz="1800" b="0" i="0" u="none" strike="noStrike" cap="none">
+            <a:endParaRPr sz="1800" b="0" i="0" u="none" strike="noStrike" cap="none" dirty="0">
               <a:solidFill>
                 <a:schemeClr val="dk1"/>
               </a:solidFill>
@@ -12924,7 +12924,7 @@
               <a:buChar char="●"/>
             </a:pPr>
             <a:r>
-              <a:rPr lang="en" sz="3200" b="0" i="0" u="none" strike="noStrike" cap="none">
+              <a:rPr lang="en" sz="3200" b="0" i="0" u="none" strike="noStrike" cap="none" dirty="0">
                 <a:solidFill>
                   <a:schemeClr val="dk1"/>
                 </a:solidFill>
@@ -12935,7 +12935,7 @@
               </a:rPr>
               <a:t>Springs now have an arbitrary number of parameters.  </a:t>
             </a:r>
-            <a:endParaRPr sz="1800" b="0" i="0" u="none" strike="noStrike" cap="none">
+            <a:endParaRPr sz="1800" b="0" i="0" u="none" strike="noStrike" cap="none" dirty="0">
               <a:solidFill>
                 <a:schemeClr val="dk1"/>
               </a:solidFill>
@@ -12961,7 +12961,7 @@
               <a:buChar char="●"/>
             </a:pPr>
             <a:r>
-              <a:rPr lang="en" sz="3200" b="0" i="0" u="none" strike="noStrike" cap="none">
+              <a:rPr lang="en" sz="3200" b="0" i="0" u="none" strike="noStrike" cap="none" dirty="0">
                 <a:solidFill>
                   <a:schemeClr val="dk1"/>
                 </a:solidFill>
@@ -12972,7 +12972,7 @@
               </a:rPr>
               <a:t>The convention is that the first parameter is the spring constant and the second parameter is the resting length.  </a:t>
             </a:r>
-            <a:endParaRPr sz="1800" b="0" i="0" u="none" strike="noStrike" cap="none">
+            <a:endParaRPr sz="1800" b="0" i="0" u="none" strike="noStrike" cap="none" dirty="0">
               <a:solidFill>
                 <a:schemeClr val="dk1"/>
               </a:solidFill>
@@ -12998,7 +12998,7 @@
               <a:buChar char="●"/>
             </a:pPr>
             <a:r>
-              <a:rPr lang="en" sz="3200" b="0" i="0" u="none" strike="noStrike" cap="none">
+              <a:rPr lang="en" sz="3200" b="0" i="0" u="none" strike="noStrike" cap="none" dirty="0">
                 <a:solidFill>
                   <a:schemeClr val="dk1"/>
                 </a:solidFill>
@@ -13010,7 +13010,7 @@
               <a:t>To get the rest length for a particular </a:t>
             </a:r>
             <a:br>
-              <a:rPr lang="en" sz="3200" b="0" i="0" u="none" strike="noStrike" cap="none">
+              <a:rPr lang="en" sz="3200" b="0" i="0" u="none" strike="noStrike" cap="none" dirty="0">
                 <a:solidFill>
                   <a:schemeClr val="dk1"/>
                 </a:solidFill>
@@ -13021,7 +13021,7 @@
               </a:rPr>
             </a:br>
             <a:r>
-              <a:rPr lang="en" sz="3200" b="0" i="0" u="none" strike="noStrike" cap="none">
+              <a:rPr lang="en" sz="3200" b="0" i="0" u="none" strike="noStrike" cap="none" dirty="0">
                 <a:solidFill>
                   <a:schemeClr val="dk1"/>
                 </a:solidFill>
@@ -13033,7 +13033,7 @@
               <a:t>spring, you would do </a:t>
             </a:r>
             <a:br>
-              <a:rPr lang="en" sz="3200" b="0" i="0" u="none" strike="noStrike" cap="none">
+              <a:rPr lang="en" sz="3200" b="0" i="0" u="none" strike="noStrike" cap="none" dirty="0">
                 <a:solidFill>
                   <a:schemeClr val="dk1"/>
                 </a:solidFill>
@@ -13044,7 +13044,7 @@
               </a:rPr>
             </a:br>
             <a:r>
-              <a:rPr lang="en" sz="3200" b="0" i="0" u="none" strike="noStrike" cap="none">
+              <a:rPr lang="en" sz="3200" b="0" i="0" u="none" strike="noStrike" cap="none" dirty="0">
                 <a:solidFill>
                   <a:schemeClr val="dk1"/>
                 </a:solidFill>
@@ -13056,7 +13056,7 @@
               <a:t>     spec-&gt;getParameters()[spring_number][1] </a:t>
             </a:r>
             <a:br>
-              <a:rPr lang="en" sz="3200" b="0" i="0" u="none" strike="noStrike" cap="none">
+              <a:rPr lang="en" sz="3200" b="0" i="0" u="none" strike="noStrike" cap="none" dirty="0">
                 <a:solidFill>
                   <a:schemeClr val="dk1"/>
                 </a:solidFill>
@@ -13066,7 +13066,7 @@
                 <a:sym typeface="Calibri"/>
               </a:rPr>
             </a:br>
-            <a:endParaRPr sz="1800" b="0" i="0" u="none" strike="noStrike" cap="none">
+            <a:endParaRPr sz="1800" b="0" i="0" u="none" strike="noStrike" cap="none" dirty="0">
               <a:solidFill>
                 <a:schemeClr val="dk1"/>
               </a:solidFill>
@@ -13211,7 +13211,7 @@
               <a:buNone/>
             </a:pPr>
             <a:r>
-              <a:rPr lang="en" sz="1400" b="0" i="0" u="none" strike="noStrike" cap="none">
+              <a:rPr lang="en" sz="1400" b="0" i="0" u="none" strike="noStrike" cap="none" dirty="0">
                 <a:solidFill>
                   <a:schemeClr val="dk1"/>
                 </a:solidFill>
@@ -13222,7 +13222,7 @@
               </a:rPr>
               <a:t>This example starts out pretty much the same as update_target_point_positions. </a:t>
             </a:r>
-            <a:endParaRPr sz="1400" b="0" i="0" u="none" strike="noStrike" cap="none">
+            <a:endParaRPr sz="1400" b="0" i="0" u="none" strike="noStrike" cap="none" dirty="0">
               <a:solidFill>
                 <a:schemeClr val="dk1"/>
               </a:solidFill>
@@ -13242,7 +13242,7 @@
               </a:spcAft>
               <a:buNone/>
             </a:pPr>
-            <a:endParaRPr sz="1400" b="0" i="0" u="none" strike="noStrike" cap="none">
+            <a:endParaRPr sz="1400" b="0" i="0" u="none" strike="noStrike" cap="none" dirty="0">
               <a:solidFill>
                 <a:schemeClr val="dk1"/>
               </a:solidFill>
@@ -13270,7 +13270,7 @@
               <a:buNone/>
             </a:pPr>
             <a:r>
-              <a:rPr lang="en" sz="1400" b="0" i="0" u="none" strike="noStrike" cap="none">
+              <a:rPr lang="en" sz="1400" b="0" i="0" u="none" strike="noStrike" cap="none" dirty="0">
                 <a:solidFill>
                   <a:schemeClr val="dk1"/>
                 </a:solidFill>
@@ -13281,7 +13281,7 @@
               </a:rPr>
               <a:t>IBSpringForceSpec* spring_spec = node_idx-&gt;getNodeDataItem&lt;IBSpringForceSpec&gt;();</a:t>
             </a:r>
-            <a:endParaRPr sz="1400" b="0" i="0" u="none" strike="noStrike" cap="none">
+            <a:endParaRPr sz="1400" b="0" i="0" u="none" strike="noStrike" cap="none" dirty="0">
               <a:solidFill>
                 <a:schemeClr val="dk1"/>
               </a:solidFill>
@@ -13309,7 +13309,7 @@
               <a:buNone/>
             </a:pPr>
             <a:r>
-              <a:rPr lang="en" sz="1400" b="0" i="0" u="none" strike="noStrike" cap="none">
+              <a:rPr lang="en" sz="1400" b="0" i="0" u="none" strike="noStrike" cap="none" dirty="0">
                 <a:solidFill>
                   <a:schemeClr val="dk1"/>
                 </a:solidFill>
@@ -13320,7 +13320,7 @@
               </a:rPr>
               <a:t>//get data from the spring, such as its resting length and stiffness.</a:t>
             </a:r>
-            <a:endParaRPr sz="1400" b="0" i="0" u="none" strike="noStrike" cap="none">
+            <a:endParaRPr sz="1400" b="0" i="0" u="none" strike="noStrike" cap="none" dirty="0">
               <a:solidFill>
                 <a:schemeClr val="dk1"/>
               </a:solidFill>
@@ -13348,7 +13348,7 @@
               <a:buNone/>
             </a:pPr>
             <a:r>
-              <a:rPr lang="en" sz="1400" b="0" i="0" u="none" strike="noStrike" cap="none">
+              <a:rPr lang="en" sz="1400" b="0" i="0" u="none" strike="noStrike" cap="none" dirty="0">
                 <a:solidFill>
                   <a:schemeClr val="dk1"/>
                 </a:solidFill>
@@ -13359,7 +13359,7 @@
               </a:rPr>
               <a:t>if (spring_spec == NULL) continue;</a:t>
             </a:r>
-            <a:endParaRPr sz="1400" b="0" i="0" u="none" strike="noStrike" cap="none">
+            <a:endParaRPr sz="1400" b="0" i="0" u="none" strike="noStrike" cap="none" dirty="0">
               <a:solidFill>
                 <a:schemeClr val="dk1"/>
               </a:solidFill>
@@ -13387,7 +13387,7 @@
               <a:buNone/>
             </a:pPr>
             <a:r>
-              <a:rPr lang="en" sz="1400" b="0" i="0" u="none" strike="noStrike" cap="none">
+              <a:rPr lang="en" sz="1400" b="0" i="0" u="none" strike="noStrike" cap="none" dirty="0">
                 <a:solidFill>
                   <a:schemeClr val="dk1"/>
                 </a:solidFill>
@@ -13398,7 +13398,7 @@
               </a:rPr>
               <a:t>//check if there is a spring associated with the node.</a:t>
             </a:r>
-            <a:endParaRPr sz="1400" b="0" i="0" u="none" strike="noStrike" cap="none">
+            <a:endParaRPr sz="1400" b="0" i="0" u="none" strike="noStrike" cap="none" dirty="0">
               <a:solidFill>
                 <a:schemeClr val="dk1"/>
               </a:solidFill>
@@ -13418,7 +13418,7 @@
               </a:spcAft>
               <a:buNone/>
             </a:pPr>
-            <a:endParaRPr sz="1400" b="0" i="0" u="none" strike="noStrike" cap="none">
+            <a:endParaRPr sz="1400" b="0" i="0" u="none" strike="noStrike" cap="none" dirty="0">
               <a:solidFill>
                 <a:schemeClr val="dk1"/>
               </a:solidFill>
@@ -13446,7 +13446,7 @@
               <a:buNone/>
             </a:pPr>
             <a:r>
-              <a:rPr lang="en" sz="1400" b="0" i="0" u="none" strike="noStrike" cap="none">
+              <a:rPr lang="en" sz="1400" b="0" i="0" u="none" strike="noStrike" cap="none" dirty="0">
                 <a:solidFill>
                   <a:schemeClr val="dk1"/>
                 </a:solidFill>
@@ -13457,7 +13457,7 @@
               </a:rPr>
               <a:t>const int lag_idx = node_idx-&gt;getLagrangianIndex();</a:t>
             </a:r>
-            <a:endParaRPr sz="1400" b="0" i="0" u="none" strike="noStrike" cap="none">
+            <a:endParaRPr sz="1400" b="0" i="0" u="none" strike="noStrike" cap="none" dirty="0">
               <a:solidFill>
                 <a:schemeClr val="dk1"/>
               </a:solidFill>
@@ -13485,7 +13485,7 @@
               <a:buNone/>
             </a:pPr>
             <a:r>
-              <a:rPr lang="en" sz="1400" b="0" i="0" u="none" strike="noStrike" cap="none">
+              <a:rPr lang="en" sz="1400" b="0" i="0" u="none" strike="noStrike" cap="none" dirty="0">
                 <a:solidFill>
                   <a:schemeClr val="dk1"/>
                 </a:solidFill>
@@ -13496,7 +13496,7 @@
               </a:rPr>
               <a:t>//get the Lagrangian index for that node</a:t>
             </a:r>
-            <a:endParaRPr sz="1400" b="0" i="0" u="none" strike="noStrike" cap="none">
+            <a:endParaRPr sz="1400" b="0" i="0" u="none" strike="noStrike" cap="none" dirty="0">
               <a:solidFill>
                 <a:schemeClr val="dk1"/>
               </a:solidFill>
@@ -13523,7 +13523,7 @@
               <a:buFont typeface="Calibri"/>
               <a:buNone/>
             </a:pPr>
-            <a:endParaRPr sz="1400"/>
+            <a:endParaRPr sz="1400" dirty="0"/>
           </a:p>
           <a:p>
             <a:pPr marL="0" marR="0" lvl="0" indent="0" algn="l" rtl="0">
@@ -13543,10 +13543,10 @@
               <a:buNone/>
             </a:pPr>
             <a:r>
-              <a:rPr lang="en" sz="1400"/>
+              <a:rPr lang="en" sz="1400" dirty="0"/>
               <a:t>//There are two ways of doing this depending on the IBAMR version. The older way is commented.</a:t>
             </a:r>
-            <a:endParaRPr sz="1400"/>
+            <a:endParaRPr sz="1400" dirty="0"/>
           </a:p>
           <a:p>
             <a:pPr marL="0" marR="0" lvl="0" indent="0" algn="l" rtl="0">
@@ -13560,10 +13560,10 @@
               <a:buNone/>
             </a:pPr>
             <a:r>
-              <a:rPr lang="en" sz="1400"/>
+              <a:rPr lang="en" sz="1400" dirty="0"/>
               <a:t>//std::vector&lt;double&gt;&amp; resting_length = spring_spec-&gt;getRestingLengths();	 </a:t>
             </a:r>
-            <a:endParaRPr sz="1400"/>
+            <a:endParaRPr sz="1400" dirty="0"/>
           </a:p>
           <a:p>
             <a:pPr marL="0" marR="0" lvl="0" indent="0" algn="l" rtl="0">
@@ -13583,7 +13583,7 @@
               <a:buNone/>
             </a:pPr>
             <a:r>
-              <a:rPr lang="en" sz="1400" b="0" i="0" u="none" strike="noStrike" cap="none">
+              <a:rPr lang="en" sz="1400" b="0" i="0" u="none" strike="noStrike" cap="none" dirty="0">
                 <a:solidFill>
                   <a:schemeClr val="dk1"/>
                 </a:solidFill>
@@ -13594,7 +13594,7 @@
               </a:rPr>
               <a:t>double resting_length = spring_spec-&gt;getParameters()[0][1];</a:t>
             </a:r>
-            <a:endParaRPr sz="1400" b="0" i="0" u="none" strike="noStrike" cap="none">
+            <a:endParaRPr sz="1400" b="0" i="0" u="none" strike="noStrike" cap="none" dirty="0">
               <a:solidFill>
                 <a:schemeClr val="dk1"/>
               </a:solidFill>
@@ -13622,7 +13622,7 @@
               <a:buNone/>
             </a:pPr>
             <a:r>
-              <a:rPr lang="en" sz="1400" b="0" i="0" u="none" strike="noStrike" cap="none">
+              <a:rPr lang="en" sz="1400" b="0" i="0" u="none" strike="noStrike" cap="none" dirty="0">
                 <a:solidFill>
                   <a:schemeClr val="dk1"/>
                 </a:solidFill>
@@ -13633,7 +13633,7 @@
               </a:rPr>
               <a:t>//Get the resting lengths of the springs associated with that node. Note that you can also getStiffnesses</a:t>
             </a:r>
-            <a:endParaRPr sz="1400" b="0" i="0" u="none" strike="noStrike" cap="none">
+            <a:endParaRPr sz="1400" b="0" i="0" u="none" strike="noStrike" cap="none" dirty="0">
               <a:solidFill>
                 <a:schemeClr val="dk1"/>
               </a:solidFill>
@@ -13661,7 +13661,7 @@
               <a:buNone/>
             </a:pPr>
             <a:r>
-              <a:rPr lang="en" sz="1400" b="0" i="0" u="none" strike="noStrike" cap="none">
+              <a:rPr lang="en" sz="1400" b="0" i="0" u="none" strike="noStrike" cap="none" dirty="0">
                 <a:solidFill>
                   <a:schemeClr val="dk1"/>
                 </a:solidFill>
@@ -13672,7 +13672,7 @@
               </a:rPr>
               <a:t>//double spring_stiffness = spring_spec-&gt;getParameters()[0][0];</a:t>
             </a:r>
-            <a:endParaRPr sz="1400" b="0" i="0" u="none" strike="noStrike" cap="none">
+            <a:endParaRPr sz="1400" b="0" i="0" u="none" strike="noStrike" cap="none" dirty="0">
               <a:solidFill>
                 <a:schemeClr val="dk1"/>
               </a:solidFill>
@@ -13692,7 +13692,7 @@
               </a:spcAft>
               <a:buNone/>
             </a:pPr>
-            <a:endParaRPr sz="1400" b="0" i="0" u="none" strike="noStrike" cap="none">
+            <a:endParaRPr sz="1400" b="0" i="0" u="none" strike="noStrike" cap="none" dirty="0">
               <a:solidFill>
                 <a:schemeClr val="dk1"/>
               </a:solidFill>
@@ -13720,7 +13720,7 @@
               <a:buNone/>
             </a:pPr>
             <a:r>
-              <a:rPr lang="en" sz="1400" b="0" i="0" u="none" strike="noStrike" cap="none">
+              <a:rPr lang="en" sz="1400" b="0" i="0" u="none" strike="noStrike" cap="none" dirty="0">
                 <a:solidFill>
                   <a:schemeClr val="dk1"/>
                 </a:solidFill>
@@ -13731,7 +13731,7 @@
               </a:rPr>
               <a:t>resting_length+=0.01*dt;</a:t>
             </a:r>
-            <a:endParaRPr sz="1400" b="0" i="0" u="none" strike="noStrike" cap="none">
+            <a:endParaRPr sz="1400" b="0" i="0" u="none" strike="noStrike" cap="none" dirty="0">
               <a:solidFill>
                 <a:schemeClr val="dk1"/>
               </a:solidFill>
@@ -13759,7 +13759,7 @@
               <a:buNone/>
             </a:pPr>
             <a:r>
-              <a:rPr lang="en" sz="1400" b="0" i="0" u="none" strike="noStrike" cap="none">
+              <a:rPr lang="en" sz="1400" b="0" i="0" u="none" strike="noStrike" cap="none" dirty="0">
                 <a:solidFill>
                   <a:schemeClr val="dk1"/>
                 </a:solidFill>
@@ -13770,7 +13770,7 @@
               </a:rPr>
               <a:t>//increase the resting length of each spring with speed 0.01.</a:t>
             </a:r>
-            <a:endParaRPr sz="1400" b="0" i="0" u="none" strike="noStrike" cap="none">
+            <a:endParaRPr sz="1400" b="0" i="0" u="none" strike="noStrike" cap="none" dirty="0">
               <a:solidFill>
                 <a:schemeClr val="dk1"/>
               </a:solidFill>
@@ -13790,7 +13790,7 @@
               </a:spcAft>
               <a:buNone/>
             </a:pPr>
-            <a:endParaRPr sz="1400" b="0" i="0" u="none" strike="noStrike" cap="none">
+            <a:endParaRPr sz="1400" b="0" i="0" u="none" strike="noStrike" cap="none" dirty="0">
               <a:solidFill>
                 <a:schemeClr val="dk1"/>
               </a:solidFill>
@@ -14342,7 +14342,7 @@
               <a:buChar char="●"/>
             </a:pPr>
             <a:r>
-              <a:rPr lang="en-US" sz="3200" b="0" i="0" u="none" strike="noStrike" cap="none">
+              <a:rPr lang="en-US" sz="3200" b="0" i="0" u="none" strike="noStrike" cap="none" dirty="0">
                 <a:solidFill>
                   <a:schemeClr val="dk1"/>
                 </a:solidFill>
@@ -14353,7 +14353,7 @@
               </a:rPr>
               <a:t>This example considers two plates with bending and stretching stiffness that move apart as a result of moving target points.</a:t>
             </a:r>
-            <a:endParaRPr sz="3200" b="0" i="0" u="none" strike="noStrike" cap="none">
+            <a:endParaRPr sz="3200" b="0" i="0" u="none" strike="noStrike" cap="none" dirty="0">
               <a:solidFill>
                 <a:schemeClr val="dk1"/>
               </a:solidFill>
@@ -14379,7 +14379,7 @@
               <a:buChar char="●"/>
             </a:pPr>
             <a:r>
-              <a:rPr lang="en-US" sz="3200" b="0" i="0" u="none" strike="noStrike" cap="none">
+              <a:rPr lang="en-US" sz="3200" b="0" i="0" u="none" strike="noStrike" cap="none" dirty="0">
                 <a:solidFill>
                   <a:schemeClr val="dk1"/>
                 </a:solidFill>
@@ -14391,11 +14391,11 @@
               <a:t>The example presented here can be found </a:t>
             </a:r>
             <a:r>
-              <a:rPr lang="en-US"/>
+              <a:rPr lang="en-US" dirty="0"/>
               <a:t>in the Examples folder as </a:t>
             </a:r>
             <a:r>
-              <a:rPr lang="en-US" sz="3200" b="0" i="0" u="sng" strike="noStrike" cap="none">
+              <a:rPr lang="en-US" sz="3200" b="0" i="0" u="sng" strike="noStrike" cap="none" dirty="0" smtClean="0">
                 <a:solidFill>
                   <a:schemeClr val="hlink"/>
                 </a:solidFill>
@@ -14407,7 +14407,7 @@
               </a:rPr>
               <a:t>Example_2Dmoving_plates.zip</a:t>
             </a:r>
-            <a:endParaRPr sz="3200" b="0" i="0" u="none" strike="noStrike" cap="none">
+            <a:endParaRPr sz="3200" b="0" i="0" u="none" strike="noStrike" cap="none" dirty="0">
               <a:solidFill>
                 <a:schemeClr val="dk1"/>
               </a:solidFill>
@@ -14416,27 +14416,6 @@
               <a:cs typeface="Calibri"/>
               <a:sym typeface="Calibri"/>
             </a:endParaRPr>
-          </a:p>
-          <a:p>
-            <a:pPr marL="342900" marR="0" lvl="0" indent="-342900" algn="l" rtl="0">
-              <a:spcBef>
-                <a:spcPts val="0"/>
-              </a:spcBef>
-              <a:spcAft>
-                <a:spcPts val="0"/>
-              </a:spcAft>
-              <a:buClr>
-                <a:schemeClr val="dk1"/>
-              </a:buClr>
-              <a:buSzPts val="1900"/>
-              <a:buFont typeface="Calibri"/>
-              <a:buChar char="●"/>
-            </a:pPr>
-            <a:r>
-              <a:rPr lang="en-US"/>
-              <a:t>Note that not all browsers download this file correctly. Try firefox.</a:t>
-            </a:r>
-            <a:endParaRPr/>
           </a:p>
         </p:txBody>
       </p:sp>
@@ -14577,7 +14556,7 @@
               <a:buChar char="❖"/>
             </a:pPr>
             <a:r>
-              <a:rPr lang="en-US" sz="2400" b="0" i="0" u="none" strike="noStrike" cap="none">
+              <a:rPr lang="en-US" sz="2400" b="0" i="0" u="none" strike="noStrike" cap="none" dirty="0">
                 <a:solidFill>
                   <a:schemeClr val="dk1"/>
                 </a:solidFill>
@@ -14588,7 +14567,7 @@
               </a:rPr>
               <a:t>You can make more than one boundary in IBAMR by creating additional .spring, .vertex, .target files.</a:t>
             </a:r>
-            <a:endParaRPr sz="3200" b="0" i="0" u="none" strike="noStrike" cap="none">
+            <a:endParaRPr sz="3200" b="0" i="0" u="none" strike="noStrike" cap="none" dirty="0">
               <a:solidFill>
                 <a:schemeClr val="dk1"/>
               </a:solidFill>
@@ -14611,7 +14590,7 @@
               <a:buChar char="❖"/>
             </a:pPr>
             <a:r>
-              <a:rPr lang="en-US" sz="2400" b="0" i="0" u="none" strike="noStrike" cap="none">
+              <a:rPr lang="en-US" sz="2400" b="0" i="0" u="none" strike="noStrike" cap="none" dirty="0">
                 <a:solidFill>
                   <a:schemeClr val="dk1"/>
                 </a:solidFill>
@@ -14622,7 +14601,7 @@
               </a:rPr>
               <a:t>When you do this, you must add them to the input2d file (example for the new force code using plate2d_left_512, plate2d_rght_512):</a:t>
             </a:r>
-            <a:endParaRPr sz="3200" b="0" i="0" u="none" strike="noStrike" cap="none">
+            <a:endParaRPr sz="3200" b="0" i="0" u="none" strike="noStrike" cap="none" dirty="0">
               <a:solidFill>
                 <a:schemeClr val="dk1"/>
               </a:solidFill>
@@ -14646,7 +14625,7 @@
               <a:buFont typeface="Calibri"/>
               <a:buNone/>
             </a:pPr>
-            <a:endParaRPr sz="850" b="0" i="0" u="none" strike="noStrike" cap="none">
+            <a:endParaRPr sz="850" b="0" i="0" u="none" strike="noStrike" cap="none" dirty="0">
               <a:solidFill>
                 <a:schemeClr val="dk1"/>
               </a:solidFill>
@@ -14671,7 +14650,7 @@
               <a:buNone/>
             </a:pPr>
             <a:r>
-              <a:rPr lang="en-US" sz="1200" b="0" i="0" u="none" strike="noStrike" cap="none">
+              <a:rPr lang="en-US" sz="1200" b="0" i="0" u="none" strike="noStrike" cap="none" dirty="0" err="1">
                 <a:solidFill>
                   <a:schemeClr val="dk1"/>
                 </a:solidFill>
@@ -14680,9 +14659,21 @@
                 <a:cs typeface="Calibri"/>
                 <a:sym typeface="Calibri"/>
               </a:rPr>
-              <a:t>IBStandardInitializer {                </a:t>
+              <a:t>IBStandardInitializer</a:t>
             </a:r>
-            <a:endParaRPr sz="1200" b="0" i="0" u="none" strike="noStrike" cap="none">
+            <a:r>
+              <a:rPr lang="en-US" sz="1200" b="0" i="0" u="none" strike="noStrike" cap="none" dirty="0">
+                <a:solidFill>
+                  <a:schemeClr val="dk1"/>
+                </a:solidFill>
+                <a:latin typeface="Calibri"/>
+                <a:ea typeface="Calibri"/>
+                <a:cs typeface="Calibri"/>
+                <a:sym typeface="Calibri"/>
+              </a:rPr>
+              <a:t> {                </a:t>
+            </a:r>
+            <a:endParaRPr sz="1200" b="0" i="0" u="none" strike="noStrike" cap="none" dirty="0">
               <a:solidFill>
                 <a:schemeClr val="dk1"/>
               </a:solidFill>
@@ -14707,7 +14698,7 @@
               <a:buNone/>
             </a:pPr>
             <a:r>
-              <a:rPr lang="en-US" sz="1200" b="0" i="0" u="none" strike="noStrike" cap="none">
+              <a:rPr lang="en-US" sz="1200" b="0" i="0" u="none" strike="noStrike" cap="none" dirty="0">
                 <a:solidFill>
                   <a:schemeClr val="dk1"/>
                 </a:solidFill>
@@ -14716,9 +14707,33 @@
                 <a:cs typeface="Calibri"/>
                 <a:sym typeface="Calibri"/>
               </a:rPr>
-              <a:t>   max_levels = MAX_LEVELS                </a:t>
+              <a:t>   </a:t>
             </a:r>
-            <a:endParaRPr sz="1200" b="0" i="0" u="none" strike="noStrike" cap="none">
+            <a:r>
+              <a:rPr lang="en-US" sz="1200" b="0" i="0" u="none" strike="noStrike" cap="none" dirty="0" err="1">
+                <a:solidFill>
+                  <a:schemeClr val="dk1"/>
+                </a:solidFill>
+                <a:latin typeface="Calibri"/>
+                <a:ea typeface="Calibri"/>
+                <a:cs typeface="Calibri"/>
+                <a:sym typeface="Calibri"/>
+              </a:rPr>
+              <a:t>max_levels</a:t>
+            </a:r>
+            <a:r>
+              <a:rPr lang="en-US" sz="1200" b="0" i="0" u="none" strike="noStrike" cap="none" dirty="0">
+                <a:solidFill>
+                  <a:schemeClr val="dk1"/>
+                </a:solidFill>
+                <a:latin typeface="Calibri"/>
+                <a:ea typeface="Calibri"/>
+                <a:cs typeface="Calibri"/>
+                <a:sym typeface="Calibri"/>
+              </a:rPr>
+              <a:t> = MAX_LEVELS                </a:t>
+            </a:r>
+            <a:endParaRPr sz="1200" b="0" i="0" u="none" strike="noStrike" cap="none" dirty="0">
               <a:solidFill>
                 <a:schemeClr val="dk1"/>
               </a:solidFill>
@@ -14743,7 +14758,7 @@
               <a:buNone/>
             </a:pPr>
             <a:r>
-              <a:rPr lang="en-US" sz="1200" b="0" i="0" u="none" strike="noStrike" cap="none">
+              <a:rPr lang="en-US" sz="1200" b="0" i="0" u="none" strike="noStrike" cap="none" dirty="0">
                 <a:solidFill>
                   <a:schemeClr val="dk1"/>
                 </a:solidFill>
@@ -14752,9 +14767,33 @@
                 <a:cs typeface="Calibri"/>
                 <a:sym typeface="Calibri"/>
               </a:rPr>
-              <a:t>   structure_names = "plate2d_left_512" , "plate2d_rght_512"                </a:t>
+              <a:t>   </a:t>
             </a:r>
-            <a:endParaRPr sz="1200" b="0" i="0" u="none" strike="noStrike" cap="none">
+            <a:r>
+              <a:rPr lang="en-US" sz="1200" b="0" i="0" u="none" strike="noStrike" cap="none" dirty="0" err="1">
+                <a:solidFill>
+                  <a:schemeClr val="dk1"/>
+                </a:solidFill>
+                <a:latin typeface="Calibri"/>
+                <a:ea typeface="Calibri"/>
+                <a:cs typeface="Calibri"/>
+                <a:sym typeface="Calibri"/>
+              </a:rPr>
+              <a:t>structure_names</a:t>
+            </a:r>
+            <a:r>
+              <a:rPr lang="en-US" sz="1200" b="0" i="0" u="none" strike="noStrike" cap="none" dirty="0">
+                <a:solidFill>
+                  <a:schemeClr val="dk1"/>
+                </a:solidFill>
+                <a:latin typeface="Calibri"/>
+                <a:ea typeface="Calibri"/>
+                <a:cs typeface="Calibri"/>
+                <a:sym typeface="Calibri"/>
+              </a:rPr>
+              <a:t> = "plate2d_left_512" , "plate2d_rght_512"                </a:t>
+            </a:r>
+            <a:endParaRPr sz="1200" b="0" i="0" u="none" strike="noStrike" cap="none" dirty="0">
               <a:solidFill>
                 <a:schemeClr val="dk1"/>
               </a:solidFill>
@@ -14779,7 +14818,7 @@
               <a:buNone/>
             </a:pPr>
             <a:r>
-              <a:rPr lang="en-US" sz="1200" b="0" i="0" u="none" strike="noStrike" cap="none">
+              <a:rPr lang="en-US" sz="1200" b="0" i="0" u="none" strike="noStrike" cap="none" dirty="0">
                 <a:solidFill>
                   <a:schemeClr val="dk1"/>
                 </a:solidFill>
@@ -14790,7 +14829,7 @@
               </a:rPr>
               <a:t>   plate2d_left_512 {                </a:t>
             </a:r>
-            <a:endParaRPr sz="1200" b="0" i="0" u="none" strike="noStrike" cap="none">
+            <a:endParaRPr sz="1200" b="0" i="0" u="none" strike="noStrike" cap="none" dirty="0">
               <a:solidFill>
                 <a:schemeClr val="dk1"/>
               </a:solidFill>
@@ -14815,7 +14854,7 @@
               <a:buNone/>
             </a:pPr>
             <a:r>
-              <a:rPr lang="en-US" sz="1200" b="0" i="0" u="none" strike="noStrike" cap="none">
+              <a:rPr lang="en-US" sz="1200" b="0" i="0" u="none" strike="noStrike" cap="none" dirty="0">
                 <a:solidFill>
                   <a:schemeClr val="dk1"/>
                 </a:solidFill>
@@ -14824,9 +14863,33 @@
                 <a:cs typeface="Calibri"/>
                 <a:sym typeface="Calibri"/>
               </a:rPr>
-              <a:t>      level_number = MAX_LEVELS - 1                </a:t>
+              <a:t>      </a:t>
             </a:r>
-            <a:endParaRPr sz="1200" b="0" i="0" u="none" strike="noStrike" cap="none">
+            <a:r>
+              <a:rPr lang="en-US" sz="1200" b="0" i="0" u="none" strike="noStrike" cap="none" dirty="0" err="1">
+                <a:solidFill>
+                  <a:schemeClr val="dk1"/>
+                </a:solidFill>
+                <a:latin typeface="Calibri"/>
+                <a:ea typeface="Calibri"/>
+                <a:cs typeface="Calibri"/>
+                <a:sym typeface="Calibri"/>
+              </a:rPr>
+              <a:t>level_number</a:t>
+            </a:r>
+            <a:r>
+              <a:rPr lang="en-US" sz="1200" b="0" i="0" u="none" strike="noStrike" cap="none" dirty="0">
+                <a:solidFill>
+                  <a:schemeClr val="dk1"/>
+                </a:solidFill>
+                <a:latin typeface="Calibri"/>
+                <a:ea typeface="Calibri"/>
+                <a:cs typeface="Calibri"/>
+                <a:sym typeface="Calibri"/>
+              </a:rPr>
+              <a:t> = MAX_LEVELS - 1                </a:t>
+            </a:r>
+            <a:endParaRPr sz="1200" b="0" i="0" u="none" strike="noStrike" cap="none" dirty="0">
               <a:solidFill>
                 <a:schemeClr val="dk1"/>
               </a:solidFill>
@@ -14851,7 +14914,7 @@
               <a:buNone/>
             </a:pPr>
             <a:r>
-              <a:rPr lang="en-US" sz="1200" b="0" i="0" u="none" strike="noStrike" cap="none">
+              <a:rPr lang="en-US" sz="1200" b="0" i="0" u="none" strike="noStrike" cap="none" dirty="0">
                 <a:solidFill>
                   <a:schemeClr val="dk1"/>
                 </a:solidFill>
@@ -14862,7 +14925,7 @@
               </a:rPr>
               <a:t>   } </a:t>
             </a:r>
-            <a:endParaRPr sz="1200" b="0" i="0" u="none" strike="noStrike" cap="none">
+            <a:endParaRPr sz="1200" b="0" i="0" u="none" strike="noStrike" cap="none" dirty="0">
               <a:solidFill>
                 <a:schemeClr val="dk1"/>
               </a:solidFill>
@@ -14887,7 +14950,7 @@
               <a:buNone/>
             </a:pPr>
             <a:r>
-              <a:rPr lang="en-US" sz="1200" b="0" i="0" u="none" strike="noStrike" cap="none">
+              <a:rPr lang="en-US" sz="1200" b="0" i="0" u="none" strike="noStrike" cap="none" dirty="0">
                 <a:solidFill>
                   <a:schemeClr val="dk1"/>
                 </a:solidFill>
@@ -14898,7 +14961,7 @@
               </a:rPr>
               <a:t>      plate2d_rght_512 {                </a:t>
             </a:r>
-            <a:endParaRPr sz="1200" b="0" i="0" u="none" strike="noStrike" cap="none">
+            <a:endParaRPr sz="1200" b="0" i="0" u="none" strike="noStrike" cap="none" dirty="0">
               <a:solidFill>
                 <a:schemeClr val="dk1"/>
               </a:solidFill>
@@ -14923,7 +14986,7 @@
               <a:buNone/>
             </a:pPr>
             <a:r>
-              <a:rPr lang="en-US" sz="1200" b="0" i="0" u="none" strike="noStrike" cap="none">
+              <a:rPr lang="en-US" sz="1200" b="0" i="0" u="none" strike="noStrike" cap="none" dirty="0">
                 <a:solidFill>
                   <a:schemeClr val="dk1"/>
                 </a:solidFill>
@@ -14932,9 +14995,33 @@
                 <a:cs typeface="Calibri"/>
                 <a:sym typeface="Calibri"/>
               </a:rPr>
-              <a:t>      level_number = MAX_LEVELS - 1                </a:t>
+              <a:t>      </a:t>
             </a:r>
-            <a:endParaRPr sz="1200" b="0" i="0" u="none" strike="noStrike" cap="none">
+            <a:r>
+              <a:rPr lang="en-US" sz="1200" b="0" i="0" u="none" strike="noStrike" cap="none" dirty="0" err="1">
+                <a:solidFill>
+                  <a:schemeClr val="dk1"/>
+                </a:solidFill>
+                <a:latin typeface="Calibri"/>
+                <a:ea typeface="Calibri"/>
+                <a:cs typeface="Calibri"/>
+                <a:sym typeface="Calibri"/>
+              </a:rPr>
+              <a:t>level_number</a:t>
+            </a:r>
+            <a:r>
+              <a:rPr lang="en-US" sz="1200" b="0" i="0" u="none" strike="noStrike" cap="none" dirty="0">
+                <a:solidFill>
+                  <a:schemeClr val="dk1"/>
+                </a:solidFill>
+                <a:latin typeface="Calibri"/>
+                <a:ea typeface="Calibri"/>
+                <a:cs typeface="Calibri"/>
+                <a:sym typeface="Calibri"/>
+              </a:rPr>
+              <a:t> = MAX_LEVELS - 1                </a:t>
+            </a:r>
+            <a:endParaRPr sz="1200" b="0" i="0" u="none" strike="noStrike" cap="none" dirty="0">
               <a:solidFill>
                 <a:schemeClr val="dk1"/>
               </a:solidFill>
@@ -14959,7 +15046,7 @@
               <a:buNone/>
             </a:pPr>
             <a:r>
-              <a:rPr lang="en-US" sz="1200" b="0" i="0" u="none" strike="noStrike" cap="none">
+              <a:rPr lang="en-US" sz="1200" b="0" i="0" u="none" strike="noStrike" cap="none" dirty="0">
                 <a:solidFill>
                   <a:schemeClr val="dk1"/>
                 </a:solidFill>
@@ -14970,7 +15057,7 @@
               </a:rPr>
               <a:t>   }</a:t>
             </a:r>
-            <a:endParaRPr sz="1200" b="0" i="0" u="none" strike="noStrike" cap="none">
+            <a:endParaRPr sz="1200" b="0" i="0" u="none" strike="noStrike" cap="none" dirty="0">
               <a:solidFill>
                 <a:schemeClr val="dk1"/>
               </a:solidFill>
@@ -14995,7 +15082,7 @@
               <a:buNone/>
             </a:pPr>
             <a:r>
-              <a:rPr lang="en-US" sz="1200" b="0" i="0" u="none" strike="noStrike" cap="none">
+              <a:rPr lang="en-US" sz="1200" b="0" i="0" u="none" strike="noStrike" cap="none" dirty="0">
                 <a:solidFill>
                   <a:schemeClr val="dk1"/>
                 </a:solidFill>
@@ -15006,7 +15093,7 @@
               </a:rPr>
               <a:t>} </a:t>
             </a:r>
-            <a:endParaRPr sz="1200" b="0" i="0" u="none" strike="noStrike" cap="none">
+            <a:endParaRPr sz="1200" b="0" i="0" u="none" strike="noStrike" cap="none" dirty="0">
               <a:solidFill>
                 <a:schemeClr val="dk1"/>
               </a:solidFill>
@@ -15030,7 +15117,7 @@
               <a:buFont typeface="Calibri"/>
               <a:buNone/>
             </a:pPr>
-            <a:endParaRPr sz="1200" b="0" i="0" u="none" strike="noStrike" cap="none">
+            <a:endParaRPr sz="1200" b="0" i="0" u="none" strike="noStrike" cap="none" dirty="0">
               <a:solidFill>
                 <a:schemeClr val="dk1"/>
               </a:solidFill>
@@ -15055,7 +15142,7 @@
               <a:buFont typeface="Calibri"/>
               <a:buNone/>
             </a:pPr>
-            <a:endParaRPr sz="850" b="0" i="0" u="none" strike="noStrike" cap="none">
+            <a:endParaRPr sz="850" b="0" i="0" u="none" strike="noStrike" cap="none" dirty="0">
               <a:solidFill>
                 <a:schemeClr val="dk1"/>
               </a:solidFill>
@@ -15576,7 +15663,7 @@
               <a:buNone/>
             </a:pPr>
             <a:r>
-              <a:rPr lang="en-US" sz="1800" b="0" i="0" u="none" strike="noStrike" cap="none">
+              <a:rPr lang="en-US" sz="1800" b="0" i="0" u="none" strike="noStrike" cap="none" dirty="0">
                 <a:solidFill>
                   <a:schemeClr val="dk1"/>
                 </a:solidFill>
@@ -15585,9 +15672,33 @@
                 <a:cs typeface="Calibri"/>
                 <a:sym typeface="Calibri"/>
               </a:rPr>
-              <a:t> // Find out the Lagrangian index ranges.</a:t>
+              <a:t> // Find out the </a:t>
             </a:r>
-            <a:endParaRPr sz="1800" b="0" i="0" u="none" strike="noStrike" cap="none">
+            <a:r>
+              <a:rPr lang="en-US" sz="1800" b="0" i="0" u="none" strike="noStrike" cap="none" dirty="0" err="1">
+                <a:solidFill>
+                  <a:schemeClr val="dk1"/>
+                </a:solidFill>
+                <a:latin typeface="Calibri"/>
+                <a:ea typeface="Calibri"/>
+                <a:cs typeface="Calibri"/>
+                <a:sym typeface="Calibri"/>
+              </a:rPr>
+              <a:t>Lagrangian</a:t>
+            </a:r>
+            <a:r>
+              <a:rPr lang="en-US" sz="1800" b="0" i="0" u="none" strike="noStrike" cap="none" dirty="0">
+                <a:solidFill>
+                  <a:schemeClr val="dk1"/>
+                </a:solidFill>
+                <a:latin typeface="Calibri"/>
+                <a:ea typeface="Calibri"/>
+                <a:cs typeface="Calibri"/>
+                <a:sym typeface="Calibri"/>
+              </a:rPr>
+              <a:t> index ranges.</a:t>
+            </a:r>
+            <a:endParaRPr sz="1800" b="0" i="0" u="none" strike="noStrike" cap="none" dirty="0">
               <a:solidFill>
                 <a:schemeClr val="dk1"/>
               </a:solidFill>
@@ -15608,7 +15719,7 @@
               <a:buNone/>
             </a:pPr>
             <a:r>
-              <a:rPr lang="en-US" sz="1800" b="0" i="0" u="none" strike="noStrike" cap="none">
+              <a:rPr lang="en-US" sz="1800" b="0" i="0" u="none" strike="noStrike" cap="none" dirty="0">
                 <a:solidFill>
                   <a:schemeClr val="dk1"/>
                 </a:solidFill>
@@ -15617,9 +15728,153 @@
                 <a:cs typeface="Calibri"/>
                 <a:sym typeface="Calibri"/>
               </a:rPr>
-              <a:t>    const std::pair&lt;int,int&gt;&amp; plate2d_left_lag_idxs = l_data_manager-&gt;getLagrangianStructureIndexRange(0, finest_ln);</a:t>
+              <a:t>    </a:t>
             </a:r>
-            <a:endParaRPr sz="1800" b="0" i="0" u="none" strike="noStrike" cap="none">
+            <a:r>
+              <a:rPr lang="en-US" sz="1800" b="0" i="0" u="none" strike="noStrike" cap="none" dirty="0" err="1">
+                <a:solidFill>
+                  <a:schemeClr val="dk1"/>
+                </a:solidFill>
+                <a:latin typeface="Calibri"/>
+                <a:ea typeface="Calibri"/>
+                <a:cs typeface="Calibri"/>
+                <a:sym typeface="Calibri"/>
+              </a:rPr>
+              <a:t>const</a:t>
+            </a:r>
+            <a:r>
+              <a:rPr lang="en-US" sz="1800" b="0" i="0" u="none" strike="noStrike" cap="none" dirty="0">
+                <a:solidFill>
+                  <a:schemeClr val="dk1"/>
+                </a:solidFill>
+                <a:latin typeface="Calibri"/>
+                <a:ea typeface="Calibri"/>
+                <a:cs typeface="Calibri"/>
+                <a:sym typeface="Calibri"/>
+              </a:rPr>
+              <a:t> </a:t>
+            </a:r>
+            <a:r>
+              <a:rPr lang="en-US" sz="1800" b="0" i="0" u="none" strike="noStrike" cap="none" dirty="0" err="1">
+                <a:solidFill>
+                  <a:schemeClr val="dk1"/>
+                </a:solidFill>
+                <a:latin typeface="Calibri"/>
+                <a:ea typeface="Calibri"/>
+                <a:cs typeface="Calibri"/>
+                <a:sym typeface="Calibri"/>
+              </a:rPr>
+              <a:t>std</a:t>
+            </a:r>
+            <a:r>
+              <a:rPr lang="en-US" sz="1800" b="0" i="0" u="none" strike="noStrike" cap="none" dirty="0">
+                <a:solidFill>
+                  <a:schemeClr val="dk1"/>
+                </a:solidFill>
+                <a:latin typeface="Calibri"/>
+                <a:ea typeface="Calibri"/>
+                <a:cs typeface="Calibri"/>
+                <a:sym typeface="Calibri"/>
+              </a:rPr>
+              <a:t>::pair&lt;</a:t>
+            </a:r>
+            <a:r>
+              <a:rPr lang="en-US" sz="1800" b="0" i="0" u="none" strike="noStrike" cap="none" dirty="0" err="1">
+                <a:solidFill>
+                  <a:schemeClr val="dk1"/>
+                </a:solidFill>
+                <a:latin typeface="Calibri"/>
+                <a:ea typeface="Calibri"/>
+                <a:cs typeface="Calibri"/>
+                <a:sym typeface="Calibri"/>
+              </a:rPr>
+              <a:t>int,int</a:t>
+            </a:r>
+            <a:r>
+              <a:rPr lang="en-US" sz="1800" b="0" i="0" u="none" strike="noStrike" cap="none" dirty="0">
+                <a:solidFill>
+                  <a:schemeClr val="dk1"/>
+                </a:solidFill>
+                <a:latin typeface="Calibri"/>
+                <a:ea typeface="Calibri"/>
+                <a:cs typeface="Calibri"/>
+                <a:sym typeface="Calibri"/>
+              </a:rPr>
+              <a:t>&gt;&amp; plate2d_left_lag_idxs = </a:t>
+            </a:r>
+            <a:r>
+              <a:rPr lang="en-US" sz="1800" b="0" i="0" u="none" strike="noStrike" cap="none" dirty="0" err="1">
+                <a:solidFill>
+                  <a:schemeClr val="dk1"/>
+                </a:solidFill>
+                <a:latin typeface="Calibri"/>
+                <a:ea typeface="Calibri"/>
+                <a:cs typeface="Calibri"/>
+                <a:sym typeface="Calibri"/>
+              </a:rPr>
+              <a:t>l_data_manager</a:t>
+            </a:r>
+            <a:r>
+              <a:rPr lang="en-US" sz="1800" b="0" i="0" u="none" strike="noStrike" cap="none" dirty="0">
+                <a:solidFill>
+                  <a:schemeClr val="dk1"/>
+                </a:solidFill>
+                <a:latin typeface="Calibri"/>
+                <a:ea typeface="Calibri"/>
+                <a:cs typeface="Calibri"/>
+                <a:sym typeface="Calibri"/>
+              </a:rPr>
+              <a:t>-&gt;</a:t>
+            </a:r>
+            <a:r>
+              <a:rPr lang="en-US" sz="1800" b="0" i="0" u="none" strike="noStrike" cap="none" dirty="0" err="1">
+                <a:solidFill>
+                  <a:schemeClr val="dk1"/>
+                </a:solidFill>
+                <a:latin typeface="Calibri"/>
+                <a:ea typeface="Calibri"/>
+                <a:cs typeface="Calibri"/>
+                <a:sym typeface="Calibri"/>
+              </a:rPr>
+              <a:t>getLagrangianStructureIndexRange</a:t>
+            </a:r>
+            <a:r>
+              <a:rPr lang="en-US" sz="1800" b="0" i="0" u="none" strike="noStrike" cap="none" dirty="0">
+                <a:solidFill>
+                  <a:schemeClr val="dk1"/>
+                </a:solidFill>
+                <a:latin typeface="Calibri"/>
+                <a:ea typeface="Calibri"/>
+                <a:cs typeface="Calibri"/>
+                <a:sym typeface="Calibri"/>
+              </a:rPr>
+              <a:t>(0, </a:t>
+            </a:r>
+            <a:r>
+              <a:rPr lang="en-US" sz="1800" b="0" i="0" u="none" strike="noStrike" cap="none" dirty="0" err="1">
+                <a:solidFill>
+                  <a:schemeClr val="dk1"/>
+                </a:solidFill>
+                <a:latin typeface="Calibri"/>
+                <a:ea typeface="Calibri"/>
+                <a:cs typeface="Calibri"/>
+                <a:sym typeface="Calibri"/>
+              </a:rPr>
+              <a:t>finest_ln</a:t>
+            </a:r>
+            <a:r>
+              <a:rPr lang="en-US" sz="1800" b="0" i="0" u="none" strike="noStrike" cap="none" dirty="0">
+                <a:solidFill>
+                  <a:schemeClr val="dk1"/>
+                </a:solidFill>
+                <a:latin typeface="Calibri"/>
+                <a:ea typeface="Calibri"/>
+                <a:cs typeface="Calibri"/>
+                <a:sym typeface="Calibri"/>
+              </a:rPr>
+              <a:t>);</a:t>
+            </a:r>
+            <a:endParaRPr sz="1800" b="0" i="0" u="none" strike="noStrike" cap="none" dirty="0">
               <a:solidFill>
                 <a:schemeClr val="dk1"/>
               </a:solidFill>
@@ -15640,7 +15895,7 @@
               <a:buNone/>
             </a:pPr>
             <a:r>
-              <a:rPr lang="en-US" sz="1800" b="0" i="0" u="none" strike="noStrike" cap="none">
+              <a:rPr lang="en-US" sz="1800" b="0" i="0" u="none" strike="noStrike" cap="none" dirty="0">
                 <a:solidFill>
                   <a:schemeClr val="dk1"/>
                 </a:solidFill>
@@ -15649,9 +15904,153 @@
                 <a:cs typeface="Calibri"/>
                 <a:sym typeface="Calibri"/>
               </a:rPr>
-              <a:t>    const std::pair&lt;int,int&gt;&amp; plate2d_rght_lag_idxs = l_data_manager-&gt;getLagrangianStructureIndexRange(1, finest_ln);</a:t>
+              <a:t>    </a:t>
             </a:r>
-            <a:endParaRPr sz="1800" b="0" i="0" u="none" strike="noStrike" cap="none">
+            <a:r>
+              <a:rPr lang="en-US" sz="1800" b="0" i="0" u="none" strike="noStrike" cap="none" dirty="0" err="1">
+                <a:solidFill>
+                  <a:schemeClr val="dk1"/>
+                </a:solidFill>
+                <a:latin typeface="Calibri"/>
+                <a:ea typeface="Calibri"/>
+                <a:cs typeface="Calibri"/>
+                <a:sym typeface="Calibri"/>
+              </a:rPr>
+              <a:t>const</a:t>
+            </a:r>
+            <a:r>
+              <a:rPr lang="en-US" sz="1800" b="0" i="0" u="none" strike="noStrike" cap="none" dirty="0">
+                <a:solidFill>
+                  <a:schemeClr val="dk1"/>
+                </a:solidFill>
+                <a:latin typeface="Calibri"/>
+                <a:ea typeface="Calibri"/>
+                <a:cs typeface="Calibri"/>
+                <a:sym typeface="Calibri"/>
+              </a:rPr>
+              <a:t> </a:t>
+            </a:r>
+            <a:r>
+              <a:rPr lang="en-US" sz="1800" b="0" i="0" u="none" strike="noStrike" cap="none" dirty="0" err="1">
+                <a:solidFill>
+                  <a:schemeClr val="dk1"/>
+                </a:solidFill>
+                <a:latin typeface="Calibri"/>
+                <a:ea typeface="Calibri"/>
+                <a:cs typeface="Calibri"/>
+                <a:sym typeface="Calibri"/>
+              </a:rPr>
+              <a:t>std</a:t>
+            </a:r>
+            <a:r>
+              <a:rPr lang="en-US" sz="1800" b="0" i="0" u="none" strike="noStrike" cap="none" dirty="0">
+                <a:solidFill>
+                  <a:schemeClr val="dk1"/>
+                </a:solidFill>
+                <a:latin typeface="Calibri"/>
+                <a:ea typeface="Calibri"/>
+                <a:cs typeface="Calibri"/>
+                <a:sym typeface="Calibri"/>
+              </a:rPr>
+              <a:t>::pair&lt;</a:t>
+            </a:r>
+            <a:r>
+              <a:rPr lang="en-US" sz="1800" b="0" i="0" u="none" strike="noStrike" cap="none" dirty="0" err="1">
+                <a:solidFill>
+                  <a:schemeClr val="dk1"/>
+                </a:solidFill>
+                <a:latin typeface="Calibri"/>
+                <a:ea typeface="Calibri"/>
+                <a:cs typeface="Calibri"/>
+                <a:sym typeface="Calibri"/>
+              </a:rPr>
+              <a:t>int,int</a:t>
+            </a:r>
+            <a:r>
+              <a:rPr lang="en-US" sz="1800" b="0" i="0" u="none" strike="noStrike" cap="none" dirty="0">
+                <a:solidFill>
+                  <a:schemeClr val="dk1"/>
+                </a:solidFill>
+                <a:latin typeface="Calibri"/>
+                <a:ea typeface="Calibri"/>
+                <a:cs typeface="Calibri"/>
+                <a:sym typeface="Calibri"/>
+              </a:rPr>
+              <a:t>&gt;&amp; plate2d_rght_lag_idxs = </a:t>
+            </a:r>
+            <a:r>
+              <a:rPr lang="en-US" sz="1800" b="0" i="0" u="none" strike="noStrike" cap="none" dirty="0" err="1">
+                <a:solidFill>
+                  <a:schemeClr val="dk1"/>
+                </a:solidFill>
+                <a:latin typeface="Calibri"/>
+                <a:ea typeface="Calibri"/>
+                <a:cs typeface="Calibri"/>
+                <a:sym typeface="Calibri"/>
+              </a:rPr>
+              <a:t>l_data_manager</a:t>
+            </a:r>
+            <a:r>
+              <a:rPr lang="en-US" sz="1800" b="0" i="0" u="none" strike="noStrike" cap="none" dirty="0">
+                <a:solidFill>
+                  <a:schemeClr val="dk1"/>
+                </a:solidFill>
+                <a:latin typeface="Calibri"/>
+                <a:ea typeface="Calibri"/>
+                <a:cs typeface="Calibri"/>
+                <a:sym typeface="Calibri"/>
+              </a:rPr>
+              <a:t>-&gt;</a:t>
+            </a:r>
+            <a:r>
+              <a:rPr lang="en-US" sz="1800" b="0" i="0" u="none" strike="noStrike" cap="none" dirty="0" err="1">
+                <a:solidFill>
+                  <a:schemeClr val="dk1"/>
+                </a:solidFill>
+                <a:latin typeface="Calibri"/>
+                <a:ea typeface="Calibri"/>
+                <a:cs typeface="Calibri"/>
+                <a:sym typeface="Calibri"/>
+              </a:rPr>
+              <a:t>getLagrangianStructureIndexRange</a:t>
+            </a:r>
+            <a:r>
+              <a:rPr lang="en-US" sz="1800" b="0" i="0" u="none" strike="noStrike" cap="none" dirty="0">
+                <a:solidFill>
+                  <a:schemeClr val="dk1"/>
+                </a:solidFill>
+                <a:latin typeface="Calibri"/>
+                <a:ea typeface="Calibri"/>
+                <a:cs typeface="Calibri"/>
+                <a:sym typeface="Calibri"/>
+              </a:rPr>
+              <a:t>(1, </a:t>
+            </a:r>
+            <a:r>
+              <a:rPr lang="en-US" sz="1800" b="0" i="0" u="none" strike="noStrike" cap="none" dirty="0" err="1">
+                <a:solidFill>
+                  <a:schemeClr val="dk1"/>
+                </a:solidFill>
+                <a:latin typeface="Calibri"/>
+                <a:ea typeface="Calibri"/>
+                <a:cs typeface="Calibri"/>
+                <a:sym typeface="Calibri"/>
+              </a:rPr>
+              <a:t>finest_ln</a:t>
+            </a:r>
+            <a:r>
+              <a:rPr lang="en-US" sz="1800" b="0" i="0" u="none" strike="noStrike" cap="none" dirty="0">
+                <a:solidFill>
+                  <a:schemeClr val="dk1"/>
+                </a:solidFill>
+                <a:latin typeface="Calibri"/>
+                <a:ea typeface="Calibri"/>
+                <a:cs typeface="Calibri"/>
+                <a:sym typeface="Calibri"/>
+              </a:rPr>
+              <a:t>);</a:t>
+            </a:r>
+            <a:endParaRPr sz="1800" b="0" i="0" u="none" strike="noStrike" cap="none" dirty="0">
               <a:solidFill>
                 <a:schemeClr val="dk1"/>
               </a:solidFill>
@@ -15794,7 +16193,7 @@
               <a:buNone/>
             </a:pPr>
             <a:r>
-              <a:rPr lang="en-US" sz="1600" b="0" i="0" u="none" strike="noStrike" cap="none">
+              <a:rPr lang="en-US" sz="1600" b="0" i="0" u="none" strike="noStrike" cap="none" dirty="0">
                 <a:solidFill>
                   <a:schemeClr val="dk1"/>
                 </a:solidFill>
@@ -15803,9 +16202,57 @@
                 <a:cs typeface="Calibri"/>
                 <a:sym typeface="Calibri"/>
               </a:rPr>
-              <a:t>if (current_time &lt;= time_to_acc)</a:t>
+              <a:t>if (</a:t>
             </a:r>
-            <a:endParaRPr sz="1800" b="0" i="0" u="none" strike="noStrike" cap="none">
+            <a:r>
+              <a:rPr lang="en-US" sz="1600" b="0" i="0" u="none" strike="noStrike" cap="none" dirty="0" err="1">
+                <a:solidFill>
+                  <a:schemeClr val="dk1"/>
+                </a:solidFill>
+                <a:latin typeface="Calibri"/>
+                <a:ea typeface="Calibri"/>
+                <a:cs typeface="Calibri"/>
+                <a:sym typeface="Calibri"/>
+              </a:rPr>
+              <a:t>current_time</a:t>
+            </a:r>
+            <a:r>
+              <a:rPr lang="en-US" sz="1600" b="0" i="0" u="none" strike="noStrike" cap="none" dirty="0">
+                <a:solidFill>
+                  <a:schemeClr val="dk1"/>
+                </a:solidFill>
+                <a:latin typeface="Calibri"/>
+                <a:ea typeface="Calibri"/>
+                <a:cs typeface="Calibri"/>
+                <a:sym typeface="Calibri"/>
+              </a:rPr>
+              <a:t> &lt;= </a:t>
+            </a:r>
+            <a:r>
+              <a:rPr lang="en-US" sz="1600" b="0" i="0" u="none" strike="noStrike" cap="none" dirty="0" err="1">
+                <a:solidFill>
+                  <a:schemeClr val="dk1"/>
+                </a:solidFill>
+                <a:latin typeface="Calibri"/>
+                <a:ea typeface="Calibri"/>
+                <a:cs typeface="Calibri"/>
+                <a:sym typeface="Calibri"/>
+              </a:rPr>
+              <a:t>time_to_acc</a:t>
+            </a:r>
+            <a:r>
+              <a:rPr lang="en-US" sz="1600" b="0" i="0" u="none" strike="noStrike" cap="none" dirty="0">
+                <a:solidFill>
+                  <a:schemeClr val="dk1"/>
+                </a:solidFill>
+                <a:latin typeface="Calibri"/>
+                <a:ea typeface="Calibri"/>
+                <a:cs typeface="Calibri"/>
+                <a:sym typeface="Calibri"/>
+              </a:rPr>
+              <a:t>)</a:t>
+            </a:r>
+            <a:endParaRPr sz="1800" b="0" i="0" u="none" strike="noStrike" cap="none" dirty="0">
               <a:solidFill>
                 <a:schemeClr val="dk1"/>
               </a:solidFill>
@@ -15826,7 +16273,7 @@
               <a:buNone/>
             </a:pPr>
             <a:r>
-              <a:rPr lang="en-US" sz="1600" b="0" i="0" u="none" strike="noStrike" cap="none">
+              <a:rPr lang="en-US" sz="1600" b="0" i="0" u="none" strike="noStrike" cap="none" dirty="0">
                 <a:solidFill>
                   <a:schemeClr val="dk1"/>
                 </a:solidFill>
@@ -15837,7 +16284,7 @@
               </a:rPr>
               <a:t>	{</a:t>
             </a:r>
-            <a:endParaRPr sz="1800" b="0" i="0" u="none" strike="noStrike" cap="none">
+            <a:endParaRPr sz="1800" b="0" i="0" u="none" strike="noStrike" cap="none" dirty="0">
               <a:solidFill>
                 <a:schemeClr val="dk1"/>
               </a:solidFill>
@@ -15858,7 +16305,7 @@
               <a:buNone/>
             </a:pPr>
             <a:r>
-              <a:rPr lang="en-US" sz="1600" b="0" i="0" u="none" strike="noStrike" cap="none">
+              <a:rPr lang="en-US" sz="1600" b="0" i="0" u="none" strike="noStrike" cap="none" dirty="0">
                 <a:solidFill>
                   <a:schemeClr val="dk1"/>
                 </a:solidFill>
@@ -15867,9 +16314,57 @@
                 <a:cs typeface="Calibri"/>
                 <a:sym typeface="Calibri"/>
               </a:rPr>
-              <a:t>	if (plate2d_left_lag_idxs.first &lt;= lag_idx &amp;&amp; lag_idx &lt; plate2d_left_lag_idxs.second)</a:t>
+              <a:t>	if (plate2d_left_lag_idxs.first &lt;= </a:t>
             </a:r>
-            <a:endParaRPr sz="1800" b="0" i="0" u="none" strike="noStrike" cap="none">
+            <a:r>
+              <a:rPr lang="en-US" sz="1600" b="0" i="0" u="none" strike="noStrike" cap="none" dirty="0" err="1">
+                <a:solidFill>
+                  <a:schemeClr val="dk1"/>
+                </a:solidFill>
+                <a:latin typeface="Calibri"/>
+                <a:ea typeface="Calibri"/>
+                <a:cs typeface="Calibri"/>
+                <a:sym typeface="Calibri"/>
+              </a:rPr>
+              <a:t>lag_idx</a:t>
+            </a:r>
+            <a:r>
+              <a:rPr lang="en-US" sz="1600" b="0" i="0" u="none" strike="noStrike" cap="none" dirty="0">
+                <a:solidFill>
+                  <a:schemeClr val="dk1"/>
+                </a:solidFill>
+                <a:latin typeface="Calibri"/>
+                <a:ea typeface="Calibri"/>
+                <a:cs typeface="Calibri"/>
+                <a:sym typeface="Calibri"/>
+              </a:rPr>
+              <a:t> &amp;&amp; </a:t>
+            </a:r>
+            <a:r>
+              <a:rPr lang="en-US" sz="1600" b="0" i="0" u="none" strike="noStrike" cap="none" dirty="0" err="1">
+                <a:solidFill>
+                  <a:schemeClr val="dk1"/>
+                </a:solidFill>
+                <a:latin typeface="Calibri"/>
+                <a:ea typeface="Calibri"/>
+                <a:cs typeface="Calibri"/>
+                <a:sym typeface="Calibri"/>
+              </a:rPr>
+              <a:t>lag_idx</a:t>
+            </a:r>
+            <a:r>
+              <a:rPr lang="en-US" sz="1600" b="0" i="0" u="none" strike="noStrike" cap="none" dirty="0">
+                <a:solidFill>
+                  <a:schemeClr val="dk1"/>
+                </a:solidFill>
+                <a:latin typeface="Calibri"/>
+                <a:ea typeface="Calibri"/>
+                <a:cs typeface="Calibri"/>
+                <a:sym typeface="Calibri"/>
+              </a:rPr>
+              <a:t> &lt; plate2d_left_lag_idxs.second)</a:t>
+            </a:r>
+            <a:endParaRPr sz="1800" b="0" i="0" u="none" strike="noStrike" cap="none" dirty="0">
               <a:solidFill>
                 <a:schemeClr val="dk1"/>
               </a:solidFill>
@@ -15890,7 +16385,7 @@
               <a:buNone/>
             </a:pPr>
             <a:r>
-              <a:rPr lang="en-US" sz="1600" b="0" i="0" u="none" strike="noStrike" cap="none">
+              <a:rPr lang="en-US" sz="1600" b="0" i="0" u="none" strike="noStrike" cap="none" dirty="0">
                 <a:solidFill>
                   <a:schemeClr val="dk1"/>
                 </a:solidFill>
@@ -15901,7 +16396,7 @@
               </a:rPr>
               <a:t>	 	{</a:t>
             </a:r>
-            <a:endParaRPr sz="1800" b="0" i="0" u="none" strike="noStrike" cap="none">
+            <a:endParaRPr sz="1800" b="0" i="0" u="none" strike="noStrike" cap="none" dirty="0">
               <a:solidFill>
                 <a:schemeClr val="dk1"/>
               </a:solidFill>
@@ -15922,7 +16417,7 @@
               <a:buNone/>
             </a:pPr>
             <a:r>
-              <a:rPr lang="en-US" sz="1600" b="0" i="0" u="none" strike="noStrike" cap="none">
+              <a:rPr lang="en-US" sz="1600" b="0" i="0" u="none" strike="noStrike" cap="none" dirty="0">
                 <a:solidFill>
                   <a:schemeClr val="dk1"/>
                 </a:solidFill>
@@ -15931,9 +16426,105 @@
                 <a:cs typeface="Calibri"/>
                 <a:sym typeface="Calibri"/>
               </a:rPr>
-              <a:t>		X_target[0]-=current_time/time_to_acc*V*dt;</a:t>
+              <a:t>		</a:t>
             </a:r>
-            <a:endParaRPr sz="1800" b="0" i="0" u="none" strike="noStrike" cap="none">
+            <a:r>
+              <a:rPr lang="en-US" sz="1600" b="0" i="0" u="none" strike="noStrike" cap="none" dirty="0" err="1">
+                <a:solidFill>
+                  <a:schemeClr val="dk1"/>
+                </a:solidFill>
+                <a:latin typeface="Calibri"/>
+                <a:ea typeface="Calibri"/>
+                <a:cs typeface="Calibri"/>
+                <a:sym typeface="Calibri"/>
+              </a:rPr>
+              <a:t>X_target</a:t>
+            </a:r>
+            <a:r>
+              <a:rPr lang="en-US" sz="1600" b="0" i="0" u="none" strike="noStrike" cap="none" dirty="0">
+                <a:solidFill>
+                  <a:schemeClr val="dk1"/>
+                </a:solidFill>
+                <a:latin typeface="Calibri"/>
+                <a:ea typeface="Calibri"/>
+                <a:cs typeface="Calibri"/>
+                <a:sym typeface="Calibri"/>
+              </a:rPr>
+              <a:t>[0]-=</a:t>
+            </a:r>
+            <a:r>
+              <a:rPr lang="en-US" sz="1600" b="0" i="0" u="none" strike="noStrike" cap="none" dirty="0" err="1">
+                <a:solidFill>
+                  <a:schemeClr val="dk1"/>
+                </a:solidFill>
+                <a:latin typeface="Calibri"/>
+                <a:ea typeface="Calibri"/>
+                <a:cs typeface="Calibri"/>
+                <a:sym typeface="Calibri"/>
+              </a:rPr>
+              <a:t>current_time</a:t>
+            </a:r>
+            <a:r>
+              <a:rPr lang="en-US" sz="1600" b="0" i="0" u="none" strike="noStrike" cap="none" dirty="0">
+                <a:solidFill>
+                  <a:schemeClr val="dk1"/>
+                </a:solidFill>
+                <a:latin typeface="Calibri"/>
+                <a:ea typeface="Calibri"/>
+                <a:cs typeface="Calibri"/>
+                <a:sym typeface="Calibri"/>
+              </a:rPr>
+              <a:t>/</a:t>
+            </a:r>
+            <a:r>
+              <a:rPr lang="en-US" sz="1600" b="0" i="0" u="none" strike="noStrike" cap="none" dirty="0" err="1">
+                <a:solidFill>
+                  <a:schemeClr val="dk1"/>
+                </a:solidFill>
+                <a:latin typeface="Calibri"/>
+                <a:ea typeface="Calibri"/>
+                <a:cs typeface="Calibri"/>
+                <a:sym typeface="Calibri"/>
+              </a:rPr>
+              <a:t>time_to_acc</a:t>
+            </a:r>
+            <a:r>
+              <a:rPr lang="en-US" sz="1600" b="0" i="0" u="none" strike="noStrike" cap="none" dirty="0">
+                <a:solidFill>
+                  <a:schemeClr val="dk1"/>
+                </a:solidFill>
+                <a:latin typeface="Calibri"/>
+                <a:ea typeface="Calibri"/>
+                <a:cs typeface="Calibri"/>
+                <a:sym typeface="Calibri"/>
+              </a:rPr>
+              <a:t>*V*</a:t>
+            </a:r>
+            <a:r>
+              <a:rPr lang="en-US" sz="1600" b="0" i="0" u="none" strike="noStrike" cap="none" dirty="0" err="1">
+                <a:solidFill>
+                  <a:schemeClr val="dk1"/>
+                </a:solidFill>
+                <a:latin typeface="Calibri"/>
+                <a:ea typeface="Calibri"/>
+                <a:cs typeface="Calibri"/>
+                <a:sym typeface="Calibri"/>
+              </a:rPr>
+              <a:t>dt</a:t>
+            </a:r>
+            <a:r>
+              <a:rPr lang="en-US" sz="1600" b="0" i="0" u="none" strike="noStrike" cap="none" dirty="0">
+                <a:solidFill>
+                  <a:schemeClr val="dk1"/>
+                </a:solidFill>
+                <a:latin typeface="Calibri"/>
+                <a:ea typeface="Calibri"/>
+                <a:cs typeface="Calibri"/>
+                <a:sym typeface="Calibri"/>
+              </a:rPr>
+              <a:t>;</a:t>
+            </a:r>
+            <a:endParaRPr sz="1800" b="0" i="0" u="none" strike="noStrike" cap="none" dirty="0">
               <a:solidFill>
                 <a:schemeClr val="dk1"/>
               </a:solidFill>
@@ -15954,7 +16545,7 @@
               <a:buNone/>
             </a:pPr>
             <a:r>
-              <a:rPr lang="en-US" sz="1600" b="0" i="0" u="none" strike="noStrike" cap="none">
+              <a:rPr lang="en-US" sz="1600" b="0" i="0" u="none" strike="noStrike" cap="none" dirty="0">
                 <a:solidFill>
                   <a:schemeClr val="dk1"/>
                 </a:solidFill>
@@ -15965,7 +16556,7 @@
               </a:rPr>
               <a:t>		 }</a:t>
             </a:r>
-            <a:endParaRPr sz="1800" b="0" i="0" u="none" strike="noStrike" cap="none">
+            <a:endParaRPr sz="1800" b="0" i="0" u="none" strike="noStrike" cap="none" dirty="0">
               <a:solidFill>
                 <a:schemeClr val="dk1"/>
               </a:solidFill>
@@ -15986,7 +16577,7 @@
               <a:buNone/>
             </a:pPr>
             <a:r>
-              <a:rPr lang="en-US" sz="1600" b="0" i="0" u="none" strike="noStrike" cap="none">
+              <a:rPr lang="en-US" sz="1600" b="0" i="0" u="none" strike="noStrike" cap="none" dirty="0">
                 <a:solidFill>
                   <a:schemeClr val="dk1"/>
                 </a:solidFill>
@@ -15995,9 +16586,57 @@
                 <a:cs typeface="Calibri"/>
                 <a:sym typeface="Calibri"/>
               </a:rPr>
-              <a:t>	 if (plate2d_rght_lag_idxs.first &lt;= lag_idx &amp;&amp; lag_idx &lt; plate2d_rght_lag_idxs.second)</a:t>
+              <a:t>	 if (plate2d_rght_lag_idxs.first &lt;= </a:t>
             </a:r>
-            <a:endParaRPr sz="1800" b="0" i="0" u="none" strike="noStrike" cap="none">
+            <a:r>
+              <a:rPr lang="en-US" sz="1600" b="0" i="0" u="none" strike="noStrike" cap="none" dirty="0" err="1">
+                <a:solidFill>
+                  <a:schemeClr val="dk1"/>
+                </a:solidFill>
+                <a:latin typeface="Calibri"/>
+                <a:ea typeface="Calibri"/>
+                <a:cs typeface="Calibri"/>
+                <a:sym typeface="Calibri"/>
+              </a:rPr>
+              <a:t>lag_idx</a:t>
+            </a:r>
+            <a:r>
+              <a:rPr lang="en-US" sz="1600" b="0" i="0" u="none" strike="noStrike" cap="none" dirty="0">
+                <a:solidFill>
+                  <a:schemeClr val="dk1"/>
+                </a:solidFill>
+                <a:latin typeface="Calibri"/>
+                <a:ea typeface="Calibri"/>
+                <a:cs typeface="Calibri"/>
+                <a:sym typeface="Calibri"/>
+              </a:rPr>
+              <a:t> &amp;&amp; </a:t>
+            </a:r>
+            <a:r>
+              <a:rPr lang="en-US" sz="1600" b="0" i="0" u="none" strike="noStrike" cap="none" dirty="0" err="1">
+                <a:solidFill>
+                  <a:schemeClr val="dk1"/>
+                </a:solidFill>
+                <a:latin typeface="Calibri"/>
+                <a:ea typeface="Calibri"/>
+                <a:cs typeface="Calibri"/>
+                <a:sym typeface="Calibri"/>
+              </a:rPr>
+              <a:t>lag_idx</a:t>
+            </a:r>
+            <a:r>
+              <a:rPr lang="en-US" sz="1600" b="0" i="0" u="none" strike="noStrike" cap="none" dirty="0">
+                <a:solidFill>
+                  <a:schemeClr val="dk1"/>
+                </a:solidFill>
+                <a:latin typeface="Calibri"/>
+                <a:ea typeface="Calibri"/>
+                <a:cs typeface="Calibri"/>
+                <a:sym typeface="Calibri"/>
+              </a:rPr>
+              <a:t> &lt; plate2d_rght_lag_idxs.second)</a:t>
+            </a:r>
+            <a:endParaRPr sz="1800" b="0" i="0" u="none" strike="noStrike" cap="none" dirty="0">
               <a:solidFill>
                 <a:schemeClr val="dk1"/>
               </a:solidFill>
@@ -16018,7 +16657,7 @@
               <a:buNone/>
             </a:pPr>
             <a:r>
-              <a:rPr lang="en-US" sz="1600" b="0" i="0" u="none" strike="noStrike" cap="none">
+              <a:rPr lang="en-US" sz="1600" b="0" i="0" u="none" strike="noStrike" cap="none" dirty="0">
                 <a:solidFill>
                   <a:schemeClr val="dk1"/>
                 </a:solidFill>
@@ -16029,7 +16668,7 @@
               </a:rPr>
               <a:t>		{</a:t>
             </a:r>
-            <a:endParaRPr sz="1800" b="0" i="0" u="none" strike="noStrike" cap="none">
+            <a:endParaRPr sz="1800" b="0" i="0" u="none" strike="noStrike" cap="none" dirty="0">
               <a:solidFill>
                 <a:schemeClr val="dk1"/>
               </a:solidFill>
@@ -16050,7 +16689,7 @@
               <a:buNone/>
             </a:pPr>
             <a:r>
-              <a:rPr lang="en-US" sz="1600" b="0" i="0" u="none" strike="noStrike" cap="none">
+              <a:rPr lang="en-US" sz="1600" b="0" i="0" u="none" strike="noStrike" cap="none" dirty="0">
                 <a:solidFill>
                   <a:schemeClr val="dk1"/>
                 </a:solidFill>
@@ -16059,9 +16698,105 @@
                 <a:cs typeface="Calibri"/>
                 <a:sym typeface="Calibri"/>
               </a:rPr>
-              <a:t>		X_target[0]+=current_time/time_to_acc*V*dt;</a:t>
+              <a:t>		</a:t>
             </a:r>
-            <a:endParaRPr sz="1800" b="0" i="0" u="none" strike="noStrike" cap="none">
+            <a:r>
+              <a:rPr lang="en-US" sz="1600" b="0" i="0" u="none" strike="noStrike" cap="none" dirty="0" err="1">
+                <a:solidFill>
+                  <a:schemeClr val="dk1"/>
+                </a:solidFill>
+                <a:latin typeface="Calibri"/>
+                <a:ea typeface="Calibri"/>
+                <a:cs typeface="Calibri"/>
+                <a:sym typeface="Calibri"/>
+              </a:rPr>
+              <a:t>X_target</a:t>
+            </a:r>
+            <a:r>
+              <a:rPr lang="en-US" sz="1600" b="0" i="0" u="none" strike="noStrike" cap="none" dirty="0">
+                <a:solidFill>
+                  <a:schemeClr val="dk1"/>
+                </a:solidFill>
+                <a:latin typeface="Calibri"/>
+                <a:ea typeface="Calibri"/>
+                <a:cs typeface="Calibri"/>
+                <a:sym typeface="Calibri"/>
+              </a:rPr>
+              <a:t>[0]+=</a:t>
+            </a:r>
+            <a:r>
+              <a:rPr lang="en-US" sz="1600" b="0" i="0" u="none" strike="noStrike" cap="none" dirty="0" err="1">
+                <a:solidFill>
+                  <a:schemeClr val="dk1"/>
+                </a:solidFill>
+                <a:latin typeface="Calibri"/>
+                <a:ea typeface="Calibri"/>
+                <a:cs typeface="Calibri"/>
+                <a:sym typeface="Calibri"/>
+              </a:rPr>
+              <a:t>current_time</a:t>
+            </a:r>
+            <a:r>
+              <a:rPr lang="en-US" sz="1600" b="0" i="0" u="none" strike="noStrike" cap="none" dirty="0">
+                <a:solidFill>
+                  <a:schemeClr val="dk1"/>
+                </a:solidFill>
+                <a:latin typeface="Calibri"/>
+                <a:ea typeface="Calibri"/>
+                <a:cs typeface="Calibri"/>
+                <a:sym typeface="Calibri"/>
+              </a:rPr>
+              <a:t>/</a:t>
+            </a:r>
+            <a:r>
+              <a:rPr lang="en-US" sz="1600" b="0" i="0" u="none" strike="noStrike" cap="none" dirty="0" err="1">
+                <a:solidFill>
+                  <a:schemeClr val="dk1"/>
+                </a:solidFill>
+                <a:latin typeface="Calibri"/>
+                <a:ea typeface="Calibri"/>
+                <a:cs typeface="Calibri"/>
+                <a:sym typeface="Calibri"/>
+              </a:rPr>
+              <a:t>time_to_acc</a:t>
+            </a:r>
+            <a:r>
+              <a:rPr lang="en-US" sz="1600" b="0" i="0" u="none" strike="noStrike" cap="none" dirty="0">
+                <a:solidFill>
+                  <a:schemeClr val="dk1"/>
+                </a:solidFill>
+                <a:latin typeface="Calibri"/>
+                <a:ea typeface="Calibri"/>
+                <a:cs typeface="Calibri"/>
+                <a:sym typeface="Calibri"/>
+              </a:rPr>
+              <a:t>*V*</a:t>
+            </a:r>
+            <a:r>
+              <a:rPr lang="en-US" sz="1600" b="0" i="0" u="none" strike="noStrike" cap="none" dirty="0" err="1">
+                <a:solidFill>
+                  <a:schemeClr val="dk1"/>
+                </a:solidFill>
+                <a:latin typeface="Calibri"/>
+                <a:ea typeface="Calibri"/>
+                <a:cs typeface="Calibri"/>
+                <a:sym typeface="Calibri"/>
+              </a:rPr>
+              <a:t>dt</a:t>
+            </a:r>
+            <a:r>
+              <a:rPr lang="en-US" sz="1600" b="0" i="0" u="none" strike="noStrike" cap="none" dirty="0">
+                <a:solidFill>
+                  <a:schemeClr val="dk1"/>
+                </a:solidFill>
+                <a:latin typeface="Calibri"/>
+                <a:ea typeface="Calibri"/>
+                <a:cs typeface="Calibri"/>
+                <a:sym typeface="Calibri"/>
+              </a:rPr>
+              <a:t>;</a:t>
+            </a:r>
+            <a:endParaRPr sz="1800" b="0" i="0" u="none" strike="noStrike" cap="none" dirty="0">
               <a:solidFill>
                 <a:schemeClr val="dk1"/>
               </a:solidFill>
@@ -16082,7 +16817,7 @@
               <a:buNone/>
             </a:pPr>
             <a:r>
-              <a:rPr lang="en-US" sz="1600" b="0" i="0" u="none" strike="noStrike" cap="none">
+              <a:rPr lang="en-US" sz="1600" b="0" i="0" u="none" strike="noStrike" cap="none" dirty="0">
                 <a:solidFill>
                   <a:schemeClr val="dk1"/>
                 </a:solidFill>
@@ -16093,7 +16828,7 @@
               </a:rPr>
               <a:t>		}</a:t>
             </a:r>
-            <a:endParaRPr sz="1800" b="0" i="0" u="none" strike="noStrike" cap="none">
+            <a:endParaRPr sz="1800" b="0" i="0" u="none" strike="noStrike" cap="none" dirty="0">
               <a:solidFill>
                 <a:schemeClr val="dk1"/>
               </a:solidFill>
@@ -16114,7 +16849,7 @@
               <a:buNone/>
             </a:pPr>
             <a:r>
-              <a:rPr lang="en-US" sz="1600" b="0" i="0" u="none" strike="noStrike" cap="none">
+              <a:rPr lang="en-US" sz="1600" b="0" i="0" u="none" strike="noStrike" cap="none" dirty="0">
                 <a:solidFill>
                   <a:schemeClr val="dk1"/>
                 </a:solidFill>
@@ -16125,7 +16860,7 @@
               </a:rPr>
               <a:t>	}</a:t>
             </a:r>
-            <a:endParaRPr sz="1600" b="0" i="0" u="none" strike="noStrike" cap="none">
+            <a:endParaRPr sz="1600" b="0" i="0" u="none" strike="noStrike" cap="none" dirty="0">
               <a:solidFill>
                 <a:schemeClr val="dk1"/>
               </a:solidFill>
@@ -16761,7 +17496,7 @@
               <a:buChar char="●"/>
             </a:pPr>
             <a:r>
-              <a:rPr lang="en" sz="1600" b="0" i="0" u="none" strike="noStrike" cap="none">
+              <a:rPr lang="en" sz="1600" b="0" i="0" u="none" strike="noStrike" cap="none" dirty="0">
                 <a:solidFill>
                   <a:schemeClr val="dk1"/>
                 </a:solidFill>
@@ -16772,7 +17507,7 @@
               </a:rPr>
               <a:t> There is a routine (update_target_point_positions) that loops over the local IB points (i.e., the IB points that are "local to the processor"). The pseudo-code is roughly:</a:t>
             </a:r>
-            <a:endParaRPr sz="1600" b="0" i="0" u="none" strike="noStrike" cap="none">
+            <a:endParaRPr sz="1600" b="0" i="0" u="none" strike="noStrike" cap="none" dirty="0">
               <a:solidFill>
                 <a:schemeClr val="dk1"/>
               </a:solidFill>
@@ -16792,7 +17527,7 @@
               </a:spcAft>
               <a:buNone/>
             </a:pPr>
-            <a:endParaRPr sz="1600" b="0" i="0" u="none" strike="noStrike" cap="none">
+            <a:endParaRPr sz="1600" b="0" i="0" u="none" strike="noStrike" cap="none" dirty="0">
               <a:solidFill>
                 <a:schemeClr val="dk1"/>
               </a:solidFill>
@@ -16820,7 +17555,7 @@
               <a:buNone/>
             </a:pPr>
             <a:r>
-              <a:rPr lang="en" sz="1600" b="0" i="0" u="none" strike="noStrike" cap="none">
+              <a:rPr lang="en" sz="1600" b="0" i="0" u="none" strike="noStrike" cap="none" dirty="0">
                 <a:solidFill>
                   <a:schemeClr val="dk1"/>
                 </a:solidFill>
@@ -16832,7 +17567,7 @@
               <a:t> for each local IB point</a:t>
             </a:r>
             <a:br>
-              <a:rPr lang="en" sz="1600" b="0" i="0" u="none" strike="noStrike" cap="none">
+              <a:rPr lang="en" sz="1600" b="0" i="0" u="none" strike="noStrike" cap="none" dirty="0">
                 <a:solidFill>
                   <a:schemeClr val="dk1"/>
                 </a:solidFill>
@@ -16843,7 +17578,7 @@
               </a:rPr>
             </a:br>
             <a:r>
-              <a:rPr lang="en" sz="1600" b="0" i="0" u="none" strike="noStrike" cap="none">
+              <a:rPr lang="en" sz="1600" b="0" i="0" u="none" strike="noStrike" cap="none" dirty="0">
                 <a:solidFill>
                   <a:schemeClr val="dk1"/>
                 </a:solidFill>
@@ -16855,7 +17590,7 @@
               <a:t> {</a:t>
             </a:r>
             <a:br>
-              <a:rPr lang="en" sz="1600" b="0" i="0" u="none" strike="noStrike" cap="none">
+              <a:rPr lang="en" sz="1600" b="0" i="0" u="none" strike="noStrike" cap="none" dirty="0">
                 <a:solidFill>
                   <a:schemeClr val="dk1"/>
                 </a:solidFill>
@@ -16866,7 +17601,7 @@
               </a:rPr>
             </a:br>
             <a:r>
-              <a:rPr lang="en" sz="1600" b="0" i="0" u="none" strike="noStrike" cap="none">
+              <a:rPr lang="en" sz="1600" b="0" i="0" u="none" strike="noStrike" cap="none" dirty="0">
                 <a:solidFill>
                   <a:schemeClr val="dk1"/>
                 </a:solidFill>
@@ -16878,7 +17613,7 @@
               <a:t>     check to see if the point has a target point spec</a:t>
             </a:r>
             <a:br>
-              <a:rPr lang="en" sz="1600" b="0" i="0" u="none" strike="noStrike" cap="none">
+              <a:rPr lang="en" sz="1600" b="0" i="0" u="none" strike="noStrike" cap="none" dirty="0">
                 <a:solidFill>
                   <a:schemeClr val="dk1"/>
                 </a:solidFill>
@@ -16889,7 +17624,7 @@
               </a:rPr>
             </a:br>
             <a:r>
-              <a:rPr lang="en" sz="1600" b="0" i="0" u="none" strike="noStrike" cap="none">
+              <a:rPr lang="en" sz="1600" b="0" i="0" u="none" strike="noStrike" cap="none" dirty="0">
                 <a:solidFill>
                   <a:schemeClr val="dk1"/>
                 </a:solidFill>
@@ -16901,7 +17636,7 @@
               <a:t>     if yes: update the material properties w/that target spec</a:t>
             </a:r>
             <a:br>
-              <a:rPr lang="en" sz="1600" b="0" i="0" u="none" strike="noStrike" cap="none">
+              <a:rPr lang="en" sz="1600" b="0" i="0" u="none" strike="noStrike" cap="none" dirty="0">
                 <a:solidFill>
                   <a:schemeClr val="dk1"/>
                 </a:solidFill>
@@ -16912,7 +17647,7 @@
               </a:rPr>
             </a:br>
             <a:r>
-              <a:rPr lang="en" sz="1600" b="0" i="0" u="none" strike="noStrike" cap="none">
+              <a:rPr lang="en" sz="1600" b="0" i="0" u="none" strike="noStrike" cap="none" dirty="0">
                 <a:solidFill>
                   <a:schemeClr val="dk1"/>
                 </a:solidFill>
@@ -16923,7 +17658,7 @@
               </a:rPr>
               <a:t> } </a:t>
             </a:r>
-            <a:endParaRPr sz="1600" b="0" i="0" u="none" strike="noStrike" cap="none">
+            <a:endParaRPr sz="1600" b="0" i="0" u="none" strike="noStrike" cap="none" dirty="0">
               <a:solidFill>
                 <a:schemeClr val="dk1"/>
               </a:solidFill>
@@ -16943,7 +17678,7 @@
               </a:spcAft>
               <a:buNone/>
             </a:pPr>
-            <a:endParaRPr sz="1600" b="0" i="0" u="none" strike="noStrike" cap="none">
+            <a:endParaRPr sz="1600" b="0" i="0" u="none" strike="noStrike" cap="none" dirty="0">
               <a:solidFill>
                 <a:schemeClr val="dk1"/>
               </a:solidFill>
@@ -16972,11 +17707,11 @@
               <a:buChar char="●"/>
             </a:pPr>
             <a:r>
-              <a:rPr lang="en" sz="1600"/>
+              <a:rPr lang="en" sz="1600" dirty="0"/>
               <a:t> </a:t>
             </a:r>
             <a:r>
-              <a:rPr lang="en" sz="1600" b="0" i="0" u="none" strike="noStrike" cap="none">
+              <a:rPr lang="en" sz="1600" b="0" i="0" u="none" strike="noStrike" cap="none" dirty="0">
                 <a:solidFill>
                   <a:schemeClr val="dk1"/>
                 </a:solidFill>
@@ -16987,7 +17722,7 @@
               </a:rPr>
               <a:t>The properties for the target points are stored in IBTargetPointForceSpec objects. Functionality has been added to the most recent IBAMR versions to simplify the code required to access these objects. In particular, for each Lagrangian (IB) point, you can do:</a:t>
             </a:r>
-            <a:endParaRPr sz="1600" b="0" i="0" u="none" strike="noStrike" cap="none">
+            <a:endParaRPr sz="1600" b="0" i="0" u="none" strike="noStrike" cap="none" dirty="0">
               <a:solidFill>
                 <a:schemeClr val="dk1"/>
               </a:solidFill>
@@ -17007,7 +17742,7 @@
               </a:spcAft>
               <a:buNone/>
             </a:pPr>
-            <a:endParaRPr sz="1600" b="0" i="0" u="none" strike="noStrike" cap="none">
+            <a:endParaRPr sz="1600" b="0" i="0" u="none" strike="noStrike" cap="none" dirty="0">
               <a:solidFill>
                 <a:schemeClr val="dk1"/>
               </a:solidFill>
@@ -17035,7 +17770,7 @@
               <a:buNone/>
             </a:pPr>
             <a:r>
-              <a:rPr lang="en" sz="1600" b="0" i="0" u="none" strike="noStrike" cap="none">
+              <a:rPr lang="en" sz="1600" b="0" i="0" u="none" strike="noStrike" cap="none" dirty="0">
                 <a:solidFill>
                   <a:schemeClr val="dk1"/>
                 </a:solidFill>
@@ -17046,7 +17781,7 @@
               </a:rPr>
               <a:t> tbox::Pointer&lt;T&gt; spec = node_idx.getStashData&lt;T&gt;();</a:t>
             </a:r>
-            <a:endParaRPr sz="1600" b="0" i="0" u="none" strike="noStrike" cap="none">
+            <a:endParaRPr sz="1600" b="0" i="0" u="none" strike="noStrike" cap="none" dirty="0">
               <a:solidFill>
                 <a:schemeClr val="dk1"/>
               </a:solidFill>
@@ -17066,7 +17801,7 @@
               </a:spcAft>
               <a:buNone/>
             </a:pPr>
-            <a:endParaRPr sz="1600" b="0" i="0" u="none" strike="noStrike" cap="none">
+            <a:endParaRPr sz="1600" b="0" i="0" u="none" strike="noStrike" cap="none" dirty="0">
               <a:solidFill>
                 <a:schemeClr val="dk1"/>
               </a:solidFill>
@@ -17095,11 +17830,11 @@
               <a:buChar char="●"/>
             </a:pPr>
             <a:r>
-              <a:rPr lang="en" sz="1600"/>
+              <a:rPr lang="en" sz="1600" dirty="0"/>
               <a:t> </a:t>
             </a:r>
             <a:r>
-              <a:rPr lang="en" sz="1600" b="0" i="0" u="none" strike="noStrike" cap="none">
+              <a:rPr lang="en" sz="1600" b="0" i="0" u="none" strike="noStrike" cap="none" dirty="0">
                 <a:solidFill>
                   <a:schemeClr val="dk1"/>
                 </a:solidFill>
@@ -17110,7 +17845,7 @@
               </a:rPr>
               <a:t>to get a pointer to any object of type T that is associated with the Lagrangian point.</a:t>
             </a:r>
-            <a:endParaRPr sz="1600" b="0" i="0" u="none" strike="noStrike" cap="none">
+            <a:endParaRPr sz="1600" b="0" i="0" u="none" strike="noStrike" cap="none" dirty="0">
               <a:solidFill>
                 <a:schemeClr val="dk1"/>
               </a:solidFill>
@@ -17130,7 +17865,7 @@
               </a:spcAft>
               <a:buNone/>
             </a:pPr>
-            <a:endParaRPr sz="1600" b="0" i="0" u="none" strike="noStrike" cap="none">
+            <a:endParaRPr sz="1600" b="0" i="0" u="none" strike="noStrike" cap="none" dirty="0">
               <a:solidFill>
                 <a:schemeClr val="dk1"/>
               </a:solidFill>
@@ -17678,7 +18413,7 @@
               <a:buNone/>
             </a:pPr>
             <a:r>
-              <a:rPr lang="en" sz="1400" b="0" i="0" u="none" strike="noStrike" cap="none">
+              <a:rPr lang="en" sz="1400" b="0" i="0" u="none" strike="noStrike" cap="none" dirty="0">
                 <a:solidFill>
                   <a:schemeClr val="dk1"/>
                 </a:solidFill>
@@ -17689,7 +18424,7 @@
               </a:rPr>
               <a:t>const std::pair&lt;int,int&gt;&amp; wing_lag_idxs = l_data_manager-&gt;getLagrangianStructureIndexRange(0, finest_ln);</a:t>
             </a:r>
-            <a:endParaRPr sz="1400" b="0" i="0" u="none" strike="noStrike" cap="none">
+            <a:endParaRPr sz="1400" b="0" i="0" u="none" strike="noStrike" cap="none" dirty="0">
               <a:solidFill>
                 <a:schemeClr val="dk1"/>
               </a:solidFill>
@@ -17717,7 +18452,7 @@
               <a:buNone/>
             </a:pPr>
             <a:r>
-              <a:rPr lang="en" sz="1400" b="0" i="0" u="none" strike="noStrike" cap="none">
+              <a:rPr lang="en" sz="1400" b="0" i="0" u="none" strike="noStrike" cap="none" dirty="0">
                 <a:solidFill>
                   <a:schemeClr val="dk1"/>
                 </a:solidFill>
@@ -17728,7 +18463,7 @@
               </a:rPr>
               <a:t>//wing_lag_idxs.first is the first point on the wing. If you have more than one boundary, you can use this to determine which boundary you are on.</a:t>
             </a:r>
-            <a:endParaRPr sz="1400" b="0" i="0" u="none" strike="noStrike" cap="none">
+            <a:endParaRPr sz="1400" b="0" i="0" u="none" strike="noStrike" cap="none" dirty="0">
               <a:solidFill>
                 <a:schemeClr val="dk1"/>
               </a:solidFill>
@@ -17748,7 +18483,7 @@
               </a:spcAft>
               <a:buNone/>
             </a:pPr>
-            <a:endParaRPr sz="1400" b="0" i="0" u="none" strike="noStrike" cap="none">
+            <a:endParaRPr sz="1400" b="0" i="0" u="none" strike="noStrike" cap="none" dirty="0">
               <a:solidFill>
                 <a:schemeClr val="dk1"/>
               </a:solidFill>
@@ -17776,7 +18511,7 @@
               <a:buNone/>
             </a:pPr>
             <a:r>
-              <a:rPr lang="en" sz="1400" b="0" i="0" u="none" strike="noStrike" cap="none">
+              <a:rPr lang="en" sz="1400" b="0" i="0" u="none" strike="noStrike" cap="none" dirty="0">
                 <a:solidFill>
                   <a:schemeClr val="dk1"/>
                 </a:solidFill>
@@ -17787,7 +18522,7 @@
               </a:rPr>
               <a:t>for (vector&lt;LNode*&gt;::iterator it = nodes.begin(); it != nodes.end(); ++it)</a:t>
             </a:r>
-            <a:endParaRPr sz="1400" b="0" i="0" u="none" strike="noStrike" cap="none">
+            <a:endParaRPr sz="1400" b="0" i="0" u="none" strike="noStrike" cap="none" dirty="0">
               <a:solidFill>
                 <a:schemeClr val="dk1"/>
               </a:solidFill>
@@ -17815,7 +18550,7 @@
               <a:buNone/>
             </a:pPr>
             <a:r>
-              <a:rPr lang="en" sz="1400" b="0" i="0" u="none" strike="noStrike" cap="none">
+              <a:rPr lang="en" sz="1400" b="0" i="0" u="none" strike="noStrike" cap="none" dirty="0">
                 <a:solidFill>
                   <a:schemeClr val="dk1"/>
                 </a:solidFill>
@@ -17826,7 +18561,7 @@
               </a:rPr>
               <a:t>//loops over all of the nodes</a:t>
             </a:r>
-            <a:endParaRPr sz="1400" b="0" i="0" u="none" strike="noStrike" cap="none">
+            <a:endParaRPr sz="1400" b="0" i="0" u="none" strike="noStrike" cap="none" dirty="0">
               <a:solidFill>
                 <a:schemeClr val="dk1"/>
               </a:solidFill>
@@ -17846,7 +18581,7 @@
               </a:spcAft>
               <a:buNone/>
             </a:pPr>
-            <a:endParaRPr sz="1400" b="0" i="0" u="none" strike="noStrike" cap="none">
+            <a:endParaRPr sz="1400" b="0" i="0" u="none" strike="noStrike" cap="none" dirty="0">
               <a:solidFill>
                 <a:schemeClr val="dk1"/>
               </a:solidFill>
@@ -17874,7 +18609,7 @@
               <a:buNone/>
             </a:pPr>
             <a:r>
-              <a:rPr lang="en" sz="1400" b="0" i="0" u="none" strike="noStrike" cap="none">
+              <a:rPr lang="en" sz="1400" b="0" i="0" u="none" strike="noStrike" cap="none" dirty="0">
                 <a:solidFill>
                   <a:schemeClr val="dk1"/>
                 </a:solidFill>
@@ -17885,7 +18620,7 @@
               </a:rPr>
               <a:t>IBTargetPointForceSpec* force_spec = node_idx-&gt;getNodeDataItem&lt;IBTargetPointForceSpec&gt;()</a:t>
             </a:r>
-            <a:endParaRPr sz="1400" b="0" i="0" u="none" strike="noStrike" cap="none">
+            <a:endParaRPr sz="1400" b="0" i="0" u="none" strike="noStrike" cap="none" dirty="0">
               <a:solidFill>
                 <a:schemeClr val="dk1"/>
               </a:solidFill>
@@ -17913,7 +18648,7 @@
               <a:buNone/>
             </a:pPr>
             <a:r>
-              <a:rPr lang="en" sz="1400" b="0" i="0" u="none" strike="noStrike" cap="none">
+              <a:rPr lang="en" sz="1400" b="0" i="0" u="none" strike="noStrike" cap="none" dirty="0">
                 <a:solidFill>
                   <a:schemeClr val="dk1"/>
                 </a:solidFill>
@@ -17924,7 +18659,7 @@
               </a:rPr>
               <a:t>//get data from the target point, such as its position.</a:t>
             </a:r>
-            <a:endParaRPr sz="1400" b="0" i="0" u="none" strike="noStrike" cap="none">
+            <a:endParaRPr sz="1400" b="0" i="0" u="none" strike="noStrike" cap="none" dirty="0">
               <a:solidFill>
                 <a:schemeClr val="dk1"/>
               </a:solidFill>
@@ -17944,7 +18679,7 @@
               </a:spcAft>
               <a:buNone/>
             </a:pPr>
-            <a:endParaRPr sz="1400" b="0" i="0" u="none" strike="noStrike" cap="none">
+            <a:endParaRPr sz="1400" b="0" i="0" u="none" strike="noStrike" cap="none" dirty="0">
               <a:solidFill>
                 <a:schemeClr val="dk1"/>
               </a:solidFill>
@@ -17972,7 +18707,7 @@
               <a:buNone/>
             </a:pPr>
             <a:r>
-              <a:rPr lang="en" sz="1400" b="0" i="0" u="none" strike="noStrike" cap="none">
+              <a:rPr lang="en" sz="1400" b="0" i="0" u="none" strike="noStrike" cap="none" dirty="0">
                 <a:solidFill>
                   <a:schemeClr val="dk1"/>
                 </a:solidFill>
@@ -17983,7 +18718,7 @@
               </a:rPr>
               <a:t>if (force_spec == NULL) continue;</a:t>
             </a:r>
-            <a:endParaRPr sz="1400" b="0" i="0" u="none" strike="noStrike" cap="none">
+            <a:endParaRPr sz="1400" b="0" i="0" u="none" strike="noStrike" cap="none" dirty="0">
               <a:solidFill>
                 <a:schemeClr val="dk1"/>
               </a:solidFill>
@@ -18011,7 +18746,7 @@
               <a:buNone/>
             </a:pPr>
             <a:r>
-              <a:rPr lang="en" sz="1400" b="0" i="0" u="none" strike="noStrike" cap="none">
+              <a:rPr lang="en" sz="1400" b="0" i="0" u="none" strike="noStrike" cap="none" dirty="0">
                 <a:solidFill>
                   <a:schemeClr val="dk1"/>
                 </a:solidFill>
@@ -18022,7 +18757,7 @@
               </a:rPr>
               <a:t>//check if there is a target point associated with the node.</a:t>
             </a:r>
-            <a:endParaRPr sz="1400" b="0" i="0" u="none" strike="noStrike" cap="none">
+            <a:endParaRPr sz="1400" b="0" i="0" u="none" strike="noStrike" cap="none" dirty="0">
               <a:solidFill>
                 <a:schemeClr val="dk1"/>
               </a:solidFill>
@@ -18042,7 +18777,7 @@
               </a:spcAft>
               <a:buNone/>
             </a:pPr>
-            <a:endParaRPr sz="1400" b="0" i="0" u="none" strike="noStrike" cap="none">
+            <a:endParaRPr sz="1400" b="0" i="0" u="none" strike="noStrike" cap="none" dirty="0">
               <a:solidFill>
                 <a:schemeClr val="dk1"/>
               </a:solidFill>
@@ -18070,7 +18805,7 @@
               <a:buNone/>
             </a:pPr>
             <a:r>
-              <a:rPr lang="en" sz="1400" b="0" i="0" u="none" strike="noStrike" cap="none">
+              <a:rPr lang="en" sz="1400" b="0" i="0" u="none" strike="noStrike" cap="none" dirty="0">
                 <a:solidFill>
                   <a:schemeClr val="dk1"/>
                 </a:solidFill>
@@ -18081,7 +18816,7 @@
               </a:rPr>
               <a:t>const int lag_idx = node_idx-&gt;getLagrangianIndex();</a:t>
             </a:r>
-            <a:endParaRPr sz="1400" b="0" i="0" u="none" strike="noStrike" cap="none">
+            <a:endParaRPr sz="1400" b="0" i="0" u="none" strike="noStrike" cap="none" dirty="0">
               <a:solidFill>
                 <a:schemeClr val="dk1"/>
               </a:solidFill>
@@ -18109,7 +18844,7 @@
               <a:buNone/>
             </a:pPr>
             <a:r>
-              <a:rPr lang="en" sz="1400" b="0" i="0" u="none" strike="noStrike" cap="none">
+              <a:rPr lang="en" sz="1400" b="0" i="0" u="none" strike="noStrike" cap="none" dirty="0">
                 <a:solidFill>
                   <a:schemeClr val="dk1"/>
                 </a:solidFill>
@@ -18120,7 +18855,7 @@
               </a:rPr>
               <a:t>//get the Lagrangian index for that node</a:t>
             </a:r>
-            <a:endParaRPr sz="1400" b="0" i="0" u="none" strike="noStrike" cap="none">
+            <a:endParaRPr sz="1400" b="0" i="0" u="none" strike="noStrike" cap="none" dirty="0">
               <a:solidFill>
                 <a:schemeClr val="dk1"/>
               </a:solidFill>
@@ -18140,7 +18875,7 @@
               </a:spcAft>
               <a:buNone/>
             </a:pPr>
-            <a:endParaRPr sz="1400" b="0" i="0" u="none" strike="noStrike" cap="none">
+            <a:endParaRPr sz="1400" b="0" i="0" u="none" strike="noStrike" cap="none" dirty="0">
               <a:solidFill>
                 <a:schemeClr val="dk1"/>
               </a:solidFill>
@@ -18220,7 +18955,7 @@
               <a:buNone/>
             </a:pPr>
             <a:r>
-              <a:rPr lang="en" sz="1400" b="0" i="0" u="none" strike="noStrike" cap="none">
+              <a:rPr lang="en" sz="1400" b="0" i="0" u="none" strike="noStrike" cap="none" dirty="0">
                 <a:solidFill>
                   <a:schemeClr val="dk1"/>
                 </a:solidFill>
@@ -18231,7 +18966,7 @@
               </a:rPr>
               <a:t>//Depending on the version of IBAMR, you need to select one of the ways of accessing target point positions</a:t>
             </a:r>
-            <a:endParaRPr sz="1400" b="0" i="0" u="none" strike="noStrike" cap="none">
+            <a:endParaRPr sz="1400" b="0" i="0" u="none" strike="noStrike" cap="none" dirty="0">
               <a:solidFill>
                 <a:schemeClr val="dk1"/>
               </a:solidFill>
@@ -18256,7 +18991,7 @@
               <a:buNone/>
             </a:pPr>
             <a:r>
-              <a:rPr lang="en" sz="1400" b="0" i="0" u="none" strike="noStrike" cap="none">
+              <a:rPr lang="en" sz="1400" b="0" i="0" u="none" strike="noStrike" cap="none" dirty="0">
                 <a:solidFill>
                   <a:schemeClr val="dk1"/>
                 </a:solidFill>
@@ -18267,7 +19002,7 @@
               </a:rPr>
               <a:t>//TinyVector&lt;double,NDIM&gt;&amp; X_target = force_spec-&gt;getTargetPointPosition();</a:t>
             </a:r>
-            <a:endParaRPr sz="1400" b="0" i="0" u="none" strike="noStrike" cap="none">
+            <a:endParaRPr sz="1400" b="0" i="0" u="none" strike="noStrike" cap="none" dirty="0">
               <a:solidFill>
                 <a:schemeClr val="dk1"/>
               </a:solidFill>
@@ -18292,11 +19027,11 @@
               <a:buNone/>
             </a:pPr>
             <a:r>
-              <a:rPr lang="en" sz="1400"/>
+              <a:rPr lang="en" sz="1400" dirty="0"/>
               <a:t>//</a:t>
             </a:r>
             <a:r>
-              <a:rPr lang="en" sz="1400" b="0" i="0" u="none" strike="noStrike" cap="none">
+              <a:rPr lang="en" sz="1400" b="0" i="0" u="none" strike="noStrike" cap="none" dirty="0">
                 <a:solidFill>
                   <a:schemeClr val="dk1"/>
                 </a:solidFill>
@@ -18307,7 +19042,7 @@
               </a:rPr>
               <a:t>IBTK::Vector&lt;double,NDIM&gt;&amp; X_target = force_spec-&gt;getTargetPointPosition();</a:t>
             </a:r>
-            <a:endParaRPr sz="1400" b="0" i="0" u="none" strike="noStrike" cap="none">
+            <a:endParaRPr sz="1400" b="0" i="0" u="none" strike="noStrike" cap="none" dirty="0">
               <a:solidFill>
                 <a:schemeClr val="dk1"/>
               </a:solidFill>
@@ -18332,10 +19067,10 @@
               <a:buNone/>
             </a:pPr>
             <a:r>
-              <a:rPr lang="en" sz="1400"/>
+              <a:rPr lang="en" sz="1400" dirty="0"/>
               <a:t>Point&amp; X_target = force_spec-&gt;getTargetPointPosition();</a:t>
             </a:r>
-            <a:endParaRPr sz="1400"/>
+            <a:endParaRPr sz="1400" dirty="0"/>
           </a:p>
           <a:p>
             <a:pPr marL="0" marR="0" lvl="0" indent="0" algn="l" rtl="0">
@@ -18352,7 +19087,7 @@
               <a:buNone/>
             </a:pPr>
             <a:r>
-              <a:rPr lang="en" sz="1400" b="0" i="0" u="none" strike="noStrike" cap="none">
+              <a:rPr lang="en" sz="1400" b="0" i="0" u="none" strike="noStrike" cap="none" dirty="0">
                 <a:solidFill>
                   <a:schemeClr val="dk1"/>
                 </a:solidFill>
@@ -18363,7 +19098,7 @@
               </a:rPr>
               <a:t>//get the target point position since we are going to modify it.</a:t>
             </a:r>
-            <a:endParaRPr sz="1400" b="0" i="0" u="none" strike="noStrike" cap="none">
+            <a:endParaRPr sz="1400" b="0" i="0" u="none" strike="noStrike" cap="none" dirty="0">
               <a:solidFill>
                 <a:schemeClr val="dk1"/>
               </a:solidFill>
@@ -18383,7 +19118,7 @@
               </a:spcAft>
               <a:buNone/>
             </a:pPr>
-            <a:endParaRPr sz="1400" b="0" i="0" u="none" strike="noStrike" cap="none">
+            <a:endParaRPr sz="1400" b="0" i="0" u="none" strike="noStrike" cap="none" dirty="0">
               <a:solidFill>
                 <a:schemeClr val="dk1"/>
               </a:solidFill>
@@ -18408,7 +19143,7 @@
               <a:buNone/>
             </a:pPr>
             <a:r>
-              <a:rPr lang="en" sz="1400" b="0" i="0" u="none" strike="noStrike" cap="none">
+              <a:rPr lang="en" sz="1400" b="0" i="0" u="none" strike="noStrike" cap="none" dirty="0">
                 <a:solidFill>
                   <a:schemeClr val="dk1"/>
                 </a:solidFill>
@@ -18419,7 +19154,7 @@
               </a:rPr>
               <a:t>if (current_time &lt;= time_to_acc)</a:t>
             </a:r>
-            <a:endParaRPr sz="1400" b="0" i="0" u="none" strike="noStrike" cap="none">
+            <a:endParaRPr sz="1400" b="0" i="0" u="none" strike="noStrike" cap="none" dirty="0">
               <a:solidFill>
                 <a:schemeClr val="dk1"/>
               </a:solidFill>
@@ -18444,7 +19179,7 @@
               <a:buNone/>
             </a:pPr>
             <a:r>
-              <a:rPr lang="en" sz="1400" b="0" i="0" u="none" strike="noStrike" cap="none">
+              <a:rPr lang="en" sz="1400" b="0" i="0" u="none" strike="noStrike" cap="none" dirty="0">
                 <a:solidFill>
                   <a:schemeClr val="dk1"/>
                 </a:solidFill>
@@ -18455,7 +19190,7 @@
               </a:rPr>
               <a:t>//check to see if we are in the acceleration phase of the wing.</a:t>
             </a:r>
-            <a:endParaRPr sz="1400" b="0" i="0" u="none" strike="noStrike" cap="none">
+            <a:endParaRPr sz="1400" b="0" i="0" u="none" strike="noStrike" cap="none" dirty="0">
               <a:solidFill>
                 <a:schemeClr val="dk1"/>
               </a:solidFill>
@@ -18475,7 +19210,7 @@
               </a:spcAft>
               <a:buNone/>
             </a:pPr>
-            <a:endParaRPr sz="1400" b="0" i="0" u="none" strike="noStrike" cap="none">
+            <a:endParaRPr sz="1400" b="0" i="0" u="none" strike="noStrike" cap="none" dirty="0">
               <a:solidFill>
                 <a:schemeClr val="dk1"/>
               </a:solidFill>
@@ -18500,7 +19235,7 @@
               <a:buNone/>
             </a:pPr>
             <a:r>
-              <a:rPr lang="en" sz="1400" b="0" i="0" u="none" strike="noStrike" cap="none">
+              <a:rPr lang="en" sz="1400" b="0" i="0" u="none" strike="noStrike" cap="none" dirty="0">
                 <a:solidFill>
                   <a:schemeClr val="dk1"/>
                 </a:solidFill>
@@ -18511,7 +19246,7 @@
               </a:rPr>
               <a:t>if (wing_lag_idxs.first &lt;= lag_idx &amp;&amp; lag_idx &lt; wing_lag_idxs.second)</a:t>
             </a:r>
-            <a:endParaRPr sz="1400" b="0" i="0" u="none" strike="noStrike" cap="none">
+            <a:endParaRPr sz="1400" b="0" i="0" u="none" strike="noStrike" cap="none" dirty="0">
               <a:solidFill>
                 <a:schemeClr val="dk1"/>
               </a:solidFill>
@@ -18536,7 +19271,7 @@
               <a:buNone/>
             </a:pPr>
             <a:r>
-              <a:rPr lang="en" sz="1400" b="0" i="0" u="none" strike="noStrike" cap="none">
+              <a:rPr lang="en" sz="1400" b="0" i="0" u="none" strike="noStrike" cap="none" dirty="0">
                 <a:solidFill>
                   <a:schemeClr val="dk1"/>
                 </a:solidFill>
@@ -18547,7 +19282,7 @@
               </a:rPr>
               <a:t>//check to see if the node is on the first wing (it is because we only have one wing in this case).</a:t>
             </a:r>
-            <a:endParaRPr sz="1400" b="0" i="0" u="none" strike="noStrike" cap="none">
+            <a:endParaRPr sz="1400" b="0" i="0" u="none" strike="noStrike" cap="none" dirty="0">
               <a:solidFill>
                 <a:schemeClr val="dk1"/>
               </a:solidFill>
@@ -18567,7 +19302,7 @@
               </a:spcAft>
               <a:buNone/>
             </a:pPr>
-            <a:endParaRPr sz="1400" b="0" i="0" u="none" strike="noStrike" cap="none">
+            <a:endParaRPr sz="1400" b="0" i="0" u="none" strike="noStrike" cap="none" dirty="0">
               <a:solidFill>
                 <a:schemeClr val="dk1"/>
               </a:solidFill>
@@ -18592,7 +19327,7 @@
               <a:buNone/>
             </a:pPr>
             <a:r>
-              <a:rPr lang="en" sz="1400" b="0" i="0" u="none" strike="noStrike" cap="none">
+              <a:rPr lang="en" sz="1400" b="0" i="0" u="none" strike="noStrike" cap="none" dirty="0">
                 <a:solidFill>
                   <a:schemeClr val="dk1"/>
                 </a:solidFill>
@@ -18603,7 +19338,7 @@
               </a:rPr>
               <a:t>X_target[1]+=current_time/time_to_acc*V*dt;</a:t>
             </a:r>
-            <a:endParaRPr sz="1400" b="0" i="0" u="none" strike="noStrike" cap="none">
+            <a:endParaRPr sz="1400" b="0" i="0" u="none" strike="noStrike" cap="none" dirty="0">
               <a:solidFill>
                 <a:schemeClr val="dk1"/>
               </a:solidFill>
@@ -18628,7 +19363,7 @@
               <a:buNone/>
             </a:pPr>
             <a:r>
-              <a:rPr lang="en" sz="1400" b="0" i="0" u="none" strike="noStrike" cap="none">
+              <a:rPr lang="en" sz="1400" b="0" i="0" u="none" strike="noStrike" cap="none" dirty="0">
                 <a:solidFill>
                   <a:schemeClr val="dk1"/>
                 </a:solidFill>
@@ -18639,7 +19374,7 @@
               </a:rPr>
               <a:t>//determine the new position in the y-direction. We aren’t moving in the x-direction here.</a:t>
             </a:r>
-            <a:endParaRPr sz="1400" b="0" i="0" u="none" strike="noStrike" cap="none">
+            <a:endParaRPr sz="1400" b="0" i="0" u="none" strike="noStrike" cap="none" dirty="0">
               <a:solidFill>
                 <a:schemeClr val="dk1"/>
               </a:solidFill>
@@ -18659,7 +19394,7 @@
               </a:spcAft>
               <a:buNone/>
             </a:pPr>
-            <a:endParaRPr sz="1400" b="0" i="0" u="none" strike="noStrike" cap="none">
+            <a:endParaRPr sz="1400" b="0" i="0" u="none" strike="noStrike" cap="none" dirty="0">
               <a:solidFill>
                 <a:schemeClr val="dk1"/>
               </a:solidFill>
@@ -18684,7 +19419,7 @@
               <a:buNone/>
             </a:pPr>
             <a:r>
-              <a:rPr lang="en" sz="1400" b="0" i="0" u="none" strike="noStrike" cap="none">
+              <a:rPr lang="en" sz="1400" b="0" i="0" u="none" strike="noStrike" cap="none" dirty="0">
                 <a:solidFill>
                   <a:schemeClr val="dk1"/>
                 </a:solidFill>
@@ -18695,7 +19430,7 @@
               </a:rPr>
               <a:t>else</a:t>
             </a:r>
-            <a:endParaRPr sz="1400" b="0" i="0" u="none" strike="noStrike" cap="none">
+            <a:endParaRPr sz="1400" b="0" i="0" u="none" strike="noStrike" cap="none" dirty="0">
               <a:solidFill>
                 <a:schemeClr val="dk1"/>
               </a:solidFill>
@@ -18720,7 +19455,7 @@
               <a:buNone/>
             </a:pPr>
             <a:r>
-              <a:rPr lang="en" sz="1400" b="0" i="0" u="none" strike="noStrike" cap="none">
+              <a:rPr lang="en" sz="1400" b="0" i="0" u="none" strike="noStrike" cap="none" dirty="0">
                 <a:solidFill>
                   <a:schemeClr val="dk1"/>
                 </a:solidFill>
@@ -18731,7 +19466,7 @@
               </a:rPr>
               <a:t>//here we move the wing at a constant speed.</a:t>
             </a:r>
-            <a:endParaRPr sz="1400" b="0" i="0" u="none" strike="noStrike" cap="none">
+            <a:endParaRPr sz="1400" b="0" i="0" u="none" strike="noStrike" cap="none" dirty="0">
               <a:solidFill>
                 <a:schemeClr val="dk1"/>
               </a:solidFill>
@@ -19271,7 +20006,7 @@
               <a:buChar char="●"/>
             </a:pPr>
             <a:r>
-              <a:rPr lang="en" sz="3000" b="0" i="0" u="none" strike="noStrike" cap="none">
+              <a:rPr lang="en" sz="3000" b="0" i="0" u="none" strike="noStrike" cap="none" dirty="0">
                 <a:solidFill>
                   <a:schemeClr val="dk1"/>
                 </a:solidFill>
@@ -19282,7 +20017,7 @@
               </a:rPr>
               <a:t>Example_2Dsprings</a:t>
             </a:r>
-            <a:endParaRPr sz="1800" b="0" i="0" u="none" strike="noStrike" cap="none">
+            <a:endParaRPr sz="1800" b="0" i="0" u="none" strike="noStrike" cap="none" dirty="0">
               <a:solidFill>
                 <a:schemeClr val="dk1"/>
               </a:solidFill>
@@ -19311,7 +20046,7 @@
               <a:buChar char="○"/>
             </a:pPr>
             <a:r>
-              <a:rPr lang="en" sz="2600" b="0" i="0" u="none" strike="noStrike" cap="none">
+              <a:rPr lang="en" sz="2600" b="0" i="0" u="none" strike="noStrike" cap="none" dirty="0">
                 <a:solidFill>
                   <a:schemeClr val="dk1"/>
                 </a:solidFill>
@@ -19322,7 +20057,7 @@
               </a:rPr>
               <a:t>The resting lengths of a 2D fiber are increased at each time step.</a:t>
             </a:r>
-            <a:endParaRPr sz="1800" b="0" i="0" u="none" strike="noStrike" cap="none">
+            <a:endParaRPr sz="1800" b="0" i="0" u="none" strike="noStrike" cap="none" dirty="0">
               <a:solidFill>
                 <a:schemeClr val="dk1"/>
               </a:solidFill>
@@ -19351,11 +20086,11 @@
               <a:buChar char="○"/>
             </a:pPr>
             <a:r>
-              <a:rPr lang="en"/>
+              <a:rPr lang="en" dirty="0"/>
               <a:t>Go to the examples folder and download </a:t>
             </a:r>
             <a:r>
-              <a:rPr lang="en" sz="2600" b="0" i="0" u="none" strike="noStrike" cap="none">
+              <a:rPr lang="en" sz="2600" b="0" i="0" u="none" strike="noStrike" cap="none" dirty="0">
                 <a:solidFill>
                   <a:schemeClr val="dk1"/>
                 </a:solidFill>
@@ -19366,7 +20101,7 @@
               </a:rPr>
               <a:t>Example_2DSprings.zip</a:t>
             </a:r>
-            <a:endParaRPr sz="1800" b="0" i="0" u="none" strike="noStrike" cap="none">
+            <a:endParaRPr sz="1800" b="0" i="0" u="none" strike="noStrike" cap="none" dirty="0">
               <a:solidFill>
                 <a:schemeClr val="dk1"/>
               </a:solidFill>
@@ -19391,7 +20126,7 @@
               <a:buChar char="●"/>
             </a:pPr>
             <a:r>
-              <a:rPr lang="en" sz="3000" b="0" i="0" u="none" strike="noStrike" cap="none">
+              <a:rPr lang="en" sz="3000" b="0" i="0" u="none" strike="noStrike" cap="none" dirty="0">
                 <a:solidFill>
                   <a:schemeClr val="dk1"/>
                 </a:solidFill>
@@ -19402,7 +20137,7 @@
               </a:rPr>
               <a:t>New files are update_springs.C and update_springs.h.</a:t>
             </a:r>
-            <a:endParaRPr sz="1800" b="0" i="0" u="none" strike="noStrike" cap="none">
+            <a:endParaRPr sz="1800" b="0" i="0" u="none" strike="noStrike" cap="none" dirty="0">
               <a:solidFill>
                 <a:schemeClr val="dk1"/>
               </a:solidFill>
@@ -19431,7 +20166,7 @@
               <a:buChar char="○"/>
             </a:pPr>
             <a:r>
-              <a:rPr lang="en" sz="2600" b="0" i="0" u="none" strike="noStrike" cap="none">
+              <a:rPr lang="en" sz="2600" b="0" i="0" u="none" strike="noStrike" cap="none" dirty="0">
                 <a:solidFill>
                   <a:schemeClr val="dk1"/>
                 </a:solidFill>
@@ -19440,25 +20175,21 @@
                 <a:cs typeface="Calibri"/>
                 <a:sym typeface="Calibri"/>
               </a:rPr>
-              <a:t>You also need to add these files to main.C and </a:t>
+              <a:t>You also need to add these files to </a:t>
             </a:r>
             <a:r>
-              <a:rPr lang="en" sz="2600"/>
-              <a:t>makefile</a:t>
+              <a:rPr lang="en" sz="2600" b="0" i="0" u="none" strike="noStrike" cap="none" dirty="0" smtClean="0">
+                <a:solidFill>
+                  <a:schemeClr val="dk1"/>
+                </a:solidFill>
+                <a:latin typeface="Calibri"/>
+                <a:ea typeface="Calibri"/>
+                <a:cs typeface="Calibri"/>
+                <a:sym typeface="Calibri"/>
+              </a:rPr>
+              <a:t>main.C.</a:t>
             </a:r>
-            <a:r>
-              <a:rPr lang="en" sz="2600" b="0" i="0" u="none" strike="noStrike" cap="none">
-                <a:solidFill>
-                  <a:schemeClr val="dk1"/>
-                </a:solidFill>
-                <a:latin typeface="Calibri"/>
-                <a:ea typeface="Calibri"/>
-                <a:cs typeface="Calibri"/>
-                <a:sym typeface="Calibri"/>
-              </a:rPr>
-              <a:t>.</a:t>
-            </a:r>
-            <a:endParaRPr sz="1800" b="0" i="0" u="none" strike="noStrike" cap="none">
+            <a:endParaRPr sz="1800" b="0" i="0" u="none" strike="noStrike" cap="none" dirty="0">
               <a:solidFill>
                 <a:schemeClr val="dk1"/>
               </a:solidFill>
@@ -19487,7 +20218,7 @@
               <a:buChar char="○"/>
             </a:pPr>
             <a:r>
-              <a:rPr lang="en" sz="2600" b="0" i="0" u="none" strike="noStrike" cap="none">
+              <a:rPr lang="en" sz="2600" b="0" i="0" u="none" strike="noStrike" cap="none" dirty="0">
                 <a:solidFill>
                   <a:schemeClr val="dk1"/>
                 </a:solidFill>
@@ -19498,7 +20229,7 @@
               </a:rPr>
               <a:t>The idea is similar to update_target_point_positions.</a:t>
             </a:r>
-            <a:endParaRPr sz="1800" b="0" i="0" u="none" strike="noStrike" cap="none">
+            <a:endParaRPr sz="1800" b="0" i="0" u="none" strike="noStrike" cap="none" dirty="0">
               <a:solidFill>
                 <a:schemeClr val="dk1"/>
               </a:solidFill>

</xml_diff>